<commit_message>
Updated upload files and folders system and fixed some bugs
</commit_message>
<xml_diff>
--- a/Privestornet/Privestornet/PSNApplication/static/images/images.pptx
+++ b/Privestornet/Privestornet/PSNApplication/static/images/images.pptx
@@ -9,6 +9,7 @@
     <p:sldId id="257" r:id="rId3"/>
     <p:sldId id="258" r:id="rId4"/>
     <p:sldId id="259" r:id="rId5"/>
+    <p:sldId id="260" r:id="rId6"/>
   </p:sldIdLst>
   <p:sldSz cx="12192000" cy="6858000"/>
   <p:notesSz cx="6858000" cy="9144000"/>
@@ -262,7 +263,7 @@
           <a:p>
             <a:fld id="{1490F5A2-A8D0-41C9-935E-441DB79DC52F}" type="datetimeFigureOut">
               <a:rPr lang="zh-CN" altLang="en-US" smtClean="0"/>
-              <a:t>2023/10/2</a:t>
+              <a:t>2023/10/7</a:t>
             </a:fld>
             <a:endParaRPr lang="zh-CN" altLang="en-US"/>
           </a:p>
@@ -460,7 +461,7 @@
           <a:p>
             <a:fld id="{1490F5A2-A8D0-41C9-935E-441DB79DC52F}" type="datetimeFigureOut">
               <a:rPr lang="zh-CN" altLang="en-US" smtClean="0"/>
-              <a:t>2023/10/2</a:t>
+              <a:t>2023/10/7</a:t>
             </a:fld>
             <a:endParaRPr lang="zh-CN" altLang="en-US"/>
           </a:p>
@@ -668,7 +669,7 @@
           <a:p>
             <a:fld id="{1490F5A2-A8D0-41C9-935E-441DB79DC52F}" type="datetimeFigureOut">
               <a:rPr lang="zh-CN" altLang="en-US" smtClean="0"/>
-              <a:t>2023/10/2</a:t>
+              <a:t>2023/10/7</a:t>
             </a:fld>
             <a:endParaRPr lang="zh-CN" altLang="en-US"/>
           </a:p>
@@ -866,7 +867,7 @@
           <a:p>
             <a:fld id="{1490F5A2-A8D0-41C9-935E-441DB79DC52F}" type="datetimeFigureOut">
               <a:rPr lang="zh-CN" altLang="en-US" smtClean="0"/>
-              <a:t>2023/10/2</a:t>
+              <a:t>2023/10/7</a:t>
             </a:fld>
             <a:endParaRPr lang="zh-CN" altLang="en-US"/>
           </a:p>
@@ -1141,7 +1142,7 @@
           <a:p>
             <a:fld id="{1490F5A2-A8D0-41C9-935E-441DB79DC52F}" type="datetimeFigureOut">
               <a:rPr lang="zh-CN" altLang="en-US" smtClean="0"/>
-              <a:t>2023/10/2</a:t>
+              <a:t>2023/10/7</a:t>
             </a:fld>
             <a:endParaRPr lang="zh-CN" altLang="en-US"/>
           </a:p>
@@ -1406,7 +1407,7 @@
           <a:p>
             <a:fld id="{1490F5A2-A8D0-41C9-935E-441DB79DC52F}" type="datetimeFigureOut">
               <a:rPr lang="zh-CN" altLang="en-US" smtClean="0"/>
-              <a:t>2023/10/2</a:t>
+              <a:t>2023/10/7</a:t>
             </a:fld>
             <a:endParaRPr lang="zh-CN" altLang="en-US"/>
           </a:p>
@@ -1818,7 +1819,7 @@
           <a:p>
             <a:fld id="{1490F5A2-A8D0-41C9-935E-441DB79DC52F}" type="datetimeFigureOut">
               <a:rPr lang="zh-CN" altLang="en-US" smtClean="0"/>
-              <a:t>2023/10/2</a:t>
+              <a:t>2023/10/7</a:t>
             </a:fld>
             <a:endParaRPr lang="zh-CN" altLang="en-US"/>
           </a:p>
@@ -1959,7 +1960,7 @@
           <a:p>
             <a:fld id="{1490F5A2-A8D0-41C9-935E-441DB79DC52F}" type="datetimeFigureOut">
               <a:rPr lang="zh-CN" altLang="en-US" smtClean="0"/>
-              <a:t>2023/10/2</a:t>
+              <a:t>2023/10/7</a:t>
             </a:fld>
             <a:endParaRPr lang="zh-CN" altLang="en-US"/>
           </a:p>
@@ -2072,7 +2073,7 @@
           <a:p>
             <a:fld id="{1490F5A2-A8D0-41C9-935E-441DB79DC52F}" type="datetimeFigureOut">
               <a:rPr lang="zh-CN" altLang="en-US" smtClean="0"/>
-              <a:t>2023/10/2</a:t>
+              <a:t>2023/10/7</a:t>
             </a:fld>
             <a:endParaRPr lang="zh-CN" altLang="en-US"/>
           </a:p>
@@ -2383,7 +2384,7 @@
           <a:p>
             <a:fld id="{1490F5A2-A8D0-41C9-935E-441DB79DC52F}" type="datetimeFigureOut">
               <a:rPr lang="zh-CN" altLang="en-US" smtClean="0"/>
-              <a:t>2023/10/2</a:t>
+              <a:t>2023/10/7</a:t>
             </a:fld>
             <a:endParaRPr lang="zh-CN" altLang="en-US"/>
           </a:p>
@@ -2671,7 +2672,7 @@
           <a:p>
             <a:fld id="{1490F5A2-A8D0-41C9-935E-441DB79DC52F}" type="datetimeFigureOut">
               <a:rPr lang="zh-CN" altLang="en-US" smtClean="0"/>
-              <a:t>2023/10/2</a:t>
+              <a:t>2023/10/7</a:t>
             </a:fld>
             <a:endParaRPr lang="zh-CN" altLang="en-US"/>
           </a:p>
@@ -2912,7 +2913,7 @@
           <a:p>
             <a:fld id="{1490F5A2-A8D0-41C9-935E-441DB79DC52F}" type="datetimeFigureOut">
               <a:rPr lang="zh-CN" altLang="en-US" smtClean="0"/>
-              <a:t>2023/10/2</a:t>
+              <a:t>2023/10/7</a:t>
             </a:fld>
             <a:endParaRPr lang="zh-CN" altLang="en-US"/>
           </a:p>
@@ -5996,6 +5997,328 @@
 </p:sld>
 </file>
 
+<file path=ppt/slides/slide5.xml><?xml version="1.0" encoding="utf-8"?>
+<p:sld xmlns:a="http://schemas.openxmlformats.org/drawingml/2006/main" xmlns:r="http://schemas.openxmlformats.org/officeDocument/2006/relationships" xmlns:p="http://schemas.openxmlformats.org/presentationml/2006/main">
+  <p:cSld>
+    <p:spTree>
+      <p:nvGrpSpPr>
+        <p:cNvPr id="1" name=""/>
+        <p:cNvGrpSpPr/>
+        <p:nvPr/>
+      </p:nvGrpSpPr>
+      <p:grpSpPr>
+        <a:xfrm>
+          <a:off x="0" y="0"/>
+          <a:ext cx="0" cy="0"/>
+          <a:chOff x="0" y="0"/>
+          <a:chExt cx="0" cy="0"/>
+        </a:xfrm>
+      </p:grpSpPr>
+      <p:pic>
+        <p:nvPicPr>
+          <p:cNvPr id="6" name="图片 5" descr="形状&#10;&#10;低可信度描述已自动生成">
+            <a:extLst>
+              <a:ext uri="{FF2B5EF4-FFF2-40B4-BE49-F238E27FC236}">
+                <a16:creationId xmlns:a16="http://schemas.microsoft.com/office/drawing/2014/main" id="{3AF5ECCE-0E34-2079-ADC1-A246FB2299BB}"/>
+              </a:ext>
+            </a:extLst>
+          </p:cNvPr>
+          <p:cNvPicPr>
+            <a:picLocks noChangeAspect="1"/>
+          </p:cNvPicPr>
+          <p:nvPr/>
+        </p:nvPicPr>
+        <p:blipFill>
+          <a:blip r:embed="rId2">
+            <a:extLst>
+              <a:ext uri="{28A0092B-C50C-407E-A947-70E740481C1C}">
+                <a14:useLocalDpi xmlns:a14="http://schemas.microsoft.com/office/drawing/2010/main" val="0"/>
+              </a:ext>
+            </a:extLst>
+          </a:blip>
+          <a:stretch>
+            <a:fillRect/>
+          </a:stretch>
+        </p:blipFill>
+        <p:spPr>
+          <a:xfrm>
+            <a:off x="7075360" y="990905"/>
+            <a:ext cx="4876190" cy="4876190"/>
+          </a:xfrm>
+          <a:prstGeom prst="rect">
+            <a:avLst/>
+          </a:prstGeom>
+        </p:spPr>
+      </p:pic>
+      <p:pic>
+        <p:nvPicPr>
+          <p:cNvPr id="8" name="图片 7" descr="形状&#10;&#10;低可信度描述已自动生成">
+            <a:extLst>
+              <a:ext uri="{FF2B5EF4-FFF2-40B4-BE49-F238E27FC236}">
+                <a16:creationId xmlns:a16="http://schemas.microsoft.com/office/drawing/2014/main" id="{A8CBD5C2-FEE4-8DA6-04B3-41364E624A83}"/>
+              </a:ext>
+            </a:extLst>
+          </p:cNvPr>
+          <p:cNvPicPr>
+            <a:picLocks noChangeAspect="1"/>
+          </p:cNvPicPr>
+          <p:nvPr/>
+        </p:nvPicPr>
+        <p:blipFill>
+          <a:blip r:embed="rId3">
+            <a:extLst>
+              <a:ext uri="{28A0092B-C50C-407E-A947-70E740481C1C}">
+                <a14:useLocalDpi xmlns:a14="http://schemas.microsoft.com/office/drawing/2010/main" val="0"/>
+              </a:ext>
+            </a:extLst>
+          </a:blip>
+          <a:stretch>
+            <a:fillRect/>
+          </a:stretch>
+        </p:blipFill>
+        <p:spPr>
+          <a:xfrm>
+            <a:off x="933178" y="1258760"/>
+            <a:ext cx="3876658" cy="3876658"/>
+          </a:xfrm>
+          <a:prstGeom prst="rect">
+            <a:avLst/>
+          </a:prstGeom>
+        </p:spPr>
+      </p:pic>
+      <p:grpSp>
+        <p:nvGrpSpPr>
+          <p:cNvPr id="16" name="组合 15">
+            <a:extLst>
+              <a:ext uri="{FF2B5EF4-FFF2-40B4-BE49-F238E27FC236}">
+                <a16:creationId xmlns:a16="http://schemas.microsoft.com/office/drawing/2014/main" id="{0BAB8D64-49D1-F80C-6CCB-7B21FA5F4E61}"/>
+              </a:ext>
+            </a:extLst>
+          </p:cNvPr>
+          <p:cNvGrpSpPr/>
+          <p:nvPr/>
+        </p:nvGrpSpPr>
+        <p:grpSpPr>
+          <a:xfrm>
+            <a:off x="2750565" y="3559351"/>
+            <a:ext cx="2200210" cy="2200210"/>
+            <a:chOff x="3150997" y="3982876"/>
+            <a:chExt cx="1616364" cy="1616364"/>
+          </a:xfrm>
+        </p:grpSpPr>
+        <p:sp>
+          <p:nvSpPr>
+            <p:cNvPr id="11" name="椭圆 10">
+              <a:extLst>
+                <a:ext uri="{FF2B5EF4-FFF2-40B4-BE49-F238E27FC236}">
+                  <a16:creationId xmlns:a16="http://schemas.microsoft.com/office/drawing/2014/main" id="{1AE599F4-CA91-D9AA-2909-B3F5C7AFA330}"/>
+                </a:ext>
+              </a:extLst>
+            </p:cNvPr>
+            <p:cNvSpPr/>
+            <p:nvPr/>
+          </p:nvSpPr>
+          <p:spPr>
+            <a:xfrm>
+              <a:off x="3150997" y="3982876"/>
+              <a:ext cx="1616364" cy="1616364"/>
+            </a:xfrm>
+            <a:prstGeom prst="ellipse">
+              <a:avLst/>
+            </a:prstGeom>
+            <a:solidFill>
+              <a:schemeClr val="bg1"/>
+            </a:solidFill>
+            <a:ln w="76200">
+              <a:solidFill>
+                <a:schemeClr val="tx1"/>
+              </a:solidFill>
+            </a:ln>
+          </p:spPr>
+          <p:style>
+            <a:lnRef idx="2">
+              <a:schemeClr val="accent1">
+                <a:shade val="15000"/>
+              </a:schemeClr>
+            </a:lnRef>
+            <a:fillRef idx="1">
+              <a:schemeClr val="accent1"/>
+            </a:fillRef>
+            <a:effectRef idx="0">
+              <a:schemeClr val="accent1"/>
+            </a:effectRef>
+            <a:fontRef idx="minor">
+              <a:schemeClr val="lt1"/>
+            </a:fontRef>
+          </p:style>
+          <p:txBody>
+            <a:bodyPr rtlCol="0" anchor="ctr"/>
+            <a:lstStyle/>
+            <a:p>
+              <a:pPr algn="ctr"/>
+              <a:endParaRPr lang="zh-CN" altLang="en-US" dirty="0"/>
+            </a:p>
+          </p:txBody>
+        </p:sp>
+        <p:pic>
+          <p:nvPicPr>
+            <p:cNvPr id="10" name="图片 9">
+              <a:extLst>
+                <a:ext uri="{FF2B5EF4-FFF2-40B4-BE49-F238E27FC236}">
+                  <a16:creationId xmlns:a16="http://schemas.microsoft.com/office/drawing/2014/main" id="{2DA682AB-6CD9-E08D-BB85-70221DEAD9CF}"/>
+                </a:ext>
+              </a:extLst>
+            </p:cNvPr>
+            <p:cNvPicPr>
+              <a:picLocks noChangeAspect="1"/>
+            </p:cNvPicPr>
+            <p:nvPr/>
+          </p:nvPicPr>
+          <p:blipFill>
+            <a:blip r:embed="rId4">
+              <a:extLst>
+                <a:ext uri="{28A0092B-C50C-407E-A947-70E740481C1C}">
+                  <a14:useLocalDpi xmlns:a14="http://schemas.microsoft.com/office/drawing/2010/main" val="0"/>
+                </a:ext>
+              </a:extLst>
+            </a:blip>
+            <a:srcRect/>
+            <a:stretch/>
+          </p:blipFill>
+          <p:spPr>
+            <a:xfrm>
+              <a:off x="3432874" y="4264753"/>
+              <a:ext cx="1052610" cy="1052610"/>
+            </a:xfrm>
+            <a:prstGeom prst="rect">
+              <a:avLst/>
+            </a:prstGeom>
+          </p:spPr>
+        </p:pic>
+      </p:grpSp>
+      <p:grpSp>
+        <p:nvGrpSpPr>
+          <p:cNvPr id="17" name="组合 16">
+            <a:extLst>
+              <a:ext uri="{FF2B5EF4-FFF2-40B4-BE49-F238E27FC236}">
+                <a16:creationId xmlns:a16="http://schemas.microsoft.com/office/drawing/2014/main" id="{550766B7-B2A9-FAD9-4966-5BC5EF183FAC}"/>
+              </a:ext>
+            </a:extLst>
+          </p:cNvPr>
+          <p:cNvGrpSpPr/>
+          <p:nvPr/>
+        </p:nvGrpSpPr>
+        <p:grpSpPr>
+          <a:xfrm>
+            <a:off x="9751340" y="3429000"/>
+            <a:ext cx="2200210" cy="2200210"/>
+            <a:chOff x="3150997" y="3982876"/>
+            <a:chExt cx="1616364" cy="1616364"/>
+          </a:xfrm>
+        </p:grpSpPr>
+        <p:sp>
+          <p:nvSpPr>
+            <p:cNvPr id="18" name="椭圆 17">
+              <a:extLst>
+                <a:ext uri="{FF2B5EF4-FFF2-40B4-BE49-F238E27FC236}">
+                  <a16:creationId xmlns:a16="http://schemas.microsoft.com/office/drawing/2014/main" id="{FED41804-FD84-2A8F-724C-53A24ABFD77F}"/>
+                </a:ext>
+              </a:extLst>
+            </p:cNvPr>
+            <p:cNvSpPr/>
+            <p:nvPr/>
+          </p:nvSpPr>
+          <p:spPr>
+            <a:xfrm>
+              <a:off x="3150997" y="3982876"/>
+              <a:ext cx="1616364" cy="1616364"/>
+            </a:xfrm>
+            <a:prstGeom prst="ellipse">
+              <a:avLst/>
+            </a:prstGeom>
+            <a:solidFill>
+              <a:schemeClr val="bg1"/>
+            </a:solidFill>
+            <a:ln w="76200">
+              <a:solidFill>
+                <a:schemeClr val="tx1"/>
+              </a:solidFill>
+            </a:ln>
+          </p:spPr>
+          <p:style>
+            <a:lnRef idx="2">
+              <a:schemeClr val="accent1">
+                <a:shade val="15000"/>
+              </a:schemeClr>
+            </a:lnRef>
+            <a:fillRef idx="1">
+              <a:schemeClr val="accent1"/>
+            </a:fillRef>
+            <a:effectRef idx="0">
+              <a:schemeClr val="accent1"/>
+            </a:effectRef>
+            <a:fontRef idx="minor">
+              <a:schemeClr val="lt1"/>
+            </a:fontRef>
+          </p:style>
+          <p:txBody>
+            <a:bodyPr rtlCol="0" anchor="ctr"/>
+            <a:lstStyle/>
+            <a:p>
+              <a:pPr algn="ctr"/>
+              <a:endParaRPr lang="zh-CN" altLang="en-US" dirty="0"/>
+            </a:p>
+          </p:txBody>
+        </p:sp>
+        <p:pic>
+          <p:nvPicPr>
+            <p:cNvPr id="19" name="图片 18">
+              <a:extLst>
+                <a:ext uri="{FF2B5EF4-FFF2-40B4-BE49-F238E27FC236}">
+                  <a16:creationId xmlns:a16="http://schemas.microsoft.com/office/drawing/2014/main" id="{10BEFF27-E651-3CA4-CE97-2F183D4F3F73}"/>
+                </a:ext>
+              </a:extLst>
+            </p:cNvPr>
+            <p:cNvPicPr>
+              <a:picLocks noChangeAspect="1"/>
+            </p:cNvPicPr>
+            <p:nvPr/>
+          </p:nvPicPr>
+          <p:blipFill>
+            <a:blip r:embed="rId4">
+              <a:extLst>
+                <a:ext uri="{28A0092B-C50C-407E-A947-70E740481C1C}">
+                  <a14:useLocalDpi xmlns:a14="http://schemas.microsoft.com/office/drawing/2010/main" val="0"/>
+                </a:ext>
+              </a:extLst>
+            </a:blip>
+            <a:srcRect/>
+            <a:stretch/>
+          </p:blipFill>
+          <p:spPr>
+            <a:xfrm>
+              <a:off x="3432874" y="4264753"/>
+              <a:ext cx="1052610" cy="1052610"/>
+            </a:xfrm>
+            <a:prstGeom prst="rect">
+              <a:avLst/>
+            </a:prstGeom>
+          </p:spPr>
+        </p:pic>
+      </p:grpSp>
+    </p:spTree>
+    <p:extLst>
+      <p:ext uri="{BB962C8B-B14F-4D97-AF65-F5344CB8AC3E}">
+        <p14:creationId xmlns:p14="http://schemas.microsoft.com/office/powerpoint/2010/main" val="4144672861"/>
+      </p:ext>
+    </p:extLst>
+  </p:cSld>
+  <p:clrMapOvr>
+    <a:masterClrMapping/>
+  </p:clrMapOvr>
+</p:sld>
+</file>
+
 <file path=ppt/theme/theme1.xml><?xml version="1.0" encoding="utf-8"?>
 <a:theme xmlns:a="http://schemas.openxmlformats.org/drawingml/2006/main" name="Office 主题​​">
   <a:themeElements>

</xml_diff>

<commit_message>
Added dark mode, download folder ... features and fixed some bugs
</commit_message>
<xml_diff>
--- a/Privestornet/Privestornet/PSNApplication/static/images/images.pptx
+++ b/Privestornet/Privestornet/PSNApplication/static/images/images.pptx
@@ -6,10 +6,11 @@
   </p:sldMasterIdLst>
   <p:sldIdLst>
     <p:sldId id="256" r:id="rId2"/>
-    <p:sldId id="257" r:id="rId3"/>
-    <p:sldId id="258" r:id="rId4"/>
-    <p:sldId id="259" r:id="rId5"/>
-    <p:sldId id="260" r:id="rId6"/>
+    <p:sldId id="258" r:id="rId3"/>
+    <p:sldId id="259" r:id="rId4"/>
+    <p:sldId id="260" r:id="rId5"/>
+    <p:sldId id="261" r:id="rId6"/>
+    <p:sldId id="262" r:id="rId7"/>
   </p:sldIdLst>
   <p:sldSz cx="12192000" cy="6858000"/>
   <p:notesSz cx="6858000" cy="9144000"/>
@@ -263,7 +264,7 @@
           <a:p>
             <a:fld id="{1490F5A2-A8D0-41C9-935E-441DB79DC52F}" type="datetimeFigureOut">
               <a:rPr lang="zh-CN" altLang="en-US" smtClean="0"/>
-              <a:t>2023/10/7</a:t>
+              <a:t>2023/10/9</a:t>
             </a:fld>
             <a:endParaRPr lang="zh-CN" altLang="en-US"/>
           </a:p>
@@ -461,7 +462,7 @@
           <a:p>
             <a:fld id="{1490F5A2-A8D0-41C9-935E-441DB79DC52F}" type="datetimeFigureOut">
               <a:rPr lang="zh-CN" altLang="en-US" smtClean="0"/>
-              <a:t>2023/10/7</a:t>
+              <a:t>2023/10/9</a:t>
             </a:fld>
             <a:endParaRPr lang="zh-CN" altLang="en-US"/>
           </a:p>
@@ -669,7 +670,7 @@
           <a:p>
             <a:fld id="{1490F5A2-A8D0-41C9-935E-441DB79DC52F}" type="datetimeFigureOut">
               <a:rPr lang="zh-CN" altLang="en-US" smtClean="0"/>
-              <a:t>2023/10/7</a:t>
+              <a:t>2023/10/9</a:t>
             </a:fld>
             <a:endParaRPr lang="zh-CN" altLang="en-US"/>
           </a:p>
@@ -867,7 +868,7 @@
           <a:p>
             <a:fld id="{1490F5A2-A8D0-41C9-935E-441DB79DC52F}" type="datetimeFigureOut">
               <a:rPr lang="zh-CN" altLang="en-US" smtClean="0"/>
-              <a:t>2023/10/7</a:t>
+              <a:t>2023/10/9</a:t>
             </a:fld>
             <a:endParaRPr lang="zh-CN" altLang="en-US"/>
           </a:p>
@@ -1142,7 +1143,7 @@
           <a:p>
             <a:fld id="{1490F5A2-A8D0-41C9-935E-441DB79DC52F}" type="datetimeFigureOut">
               <a:rPr lang="zh-CN" altLang="en-US" smtClean="0"/>
-              <a:t>2023/10/7</a:t>
+              <a:t>2023/10/9</a:t>
             </a:fld>
             <a:endParaRPr lang="zh-CN" altLang="en-US"/>
           </a:p>
@@ -1407,7 +1408,7 @@
           <a:p>
             <a:fld id="{1490F5A2-A8D0-41C9-935E-441DB79DC52F}" type="datetimeFigureOut">
               <a:rPr lang="zh-CN" altLang="en-US" smtClean="0"/>
-              <a:t>2023/10/7</a:t>
+              <a:t>2023/10/9</a:t>
             </a:fld>
             <a:endParaRPr lang="zh-CN" altLang="en-US"/>
           </a:p>
@@ -1819,7 +1820,7 @@
           <a:p>
             <a:fld id="{1490F5A2-A8D0-41C9-935E-441DB79DC52F}" type="datetimeFigureOut">
               <a:rPr lang="zh-CN" altLang="en-US" smtClean="0"/>
-              <a:t>2023/10/7</a:t>
+              <a:t>2023/10/9</a:t>
             </a:fld>
             <a:endParaRPr lang="zh-CN" altLang="en-US"/>
           </a:p>
@@ -1960,7 +1961,7 @@
           <a:p>
             <a:fld id="{1490F5A2-A8D0-41C9-935E-441DB79DC52F}" type="datetimeFigureOut">
               <a:rPr lang="zh-CN" altLang="en-US" smtClean="0"/>
-              <a:t>2023/10/7</a:t>
+              <a:t>2023/10/9</a:t>
             </a:fld>
             <a:endParaRPr lang="zh-CN" altLang="en-US"/>
           </a:p>
@@ -2073,7 +2074,7 @@
           <a:p>
             <a:fld id="{1490F5A2-A8D0-41C9-935E-441DB79DC52F}" type="datetimeFigureOut">
               <a:rPr lang="zh-CN" altLang="en-US" smtClean="0"/>
-              <a:t>2023/10/7</a:t>
+              <a:t>2023/10/9</a:t>
             </a:fld>
             <a:endParaRPr lang="zh-CN" altLang="en-US"/>
           </a:p>
@@ -2384,7 +2385,7 @@
           <a:p>
             <a:fld id="{1490F5A2-A8D0-41C9-935E-441DB79DC52F}" type="datetimeFigureOut">
               <a:rPr lang="zh-CN" altLang="en-US" smtClean="0"/>
-              <a:t>2023/10/7</a:t>
+              <a:t>2023/10/9</a:t>
             </a:fld>
             <a:endParaRPr lang="zh-CN" altLang="en-US"/>
           </a:p>
@@ -2672,7 +2673,7 @@
           <a:p>
             <a:fld id="{1490F5A2-A8D0-41C9-935E-441DB79DC52F}" type="datetimeFigureOut">
               <a:rPr lang="zh-CN" altLang="en-US" smtClean="0"/>
-              <a:t>2023/10/7</a:t>
+              <a:t>2023/10/9</a:t>
             </a:fld>
             <a:endParaRPr lang="zh-CN" altLang="en-US"/>
           </a:p>
@@ -2913,7 +2914,7 @@
           <a:p>
             <a:fld id="{1490F5A2-A8D0-41C9-935E-441DB79DC52F}" type="datetimeFigureOut">
               <a:rPr lang="zh-CN" altLang="en-US" smtClean="0"/>
-              <a:t>2023/10/7</a:t>
+              <a:t>2023/10/9</a:t>
             </a:fld>
             <a:endParaRPr lang="zh-CN" altLang="en-US"/>
           </a:p>
@@ -5072,104 +5073,6 @@
       </p:grpSpPr>
       <p:sp>
         <p:nvSpPr>
-          <p:cNvPr id="4" name="矩形 3">
-            <a:extLst>
-              <a:ext uri="{FF2B5EF4-FFF2-40B4-BE49-F238E27FC236}">
-                <a16:creationId xmlns:a16="http://schemas.microsoft.com/office/drawing/2014/main" id="{FB57CB12-17AB-1807-4ADB-BFF3932778B4}"/>
-              </a:ext>
-            </a:extLst>
-          </p:cNvPr>
-          <p:cNvSpPr/>
-          <p:nvPr/>
-        </p:nvSpPr>
-        <p:spPr>
-          <a:xfrm>
-            <a:off x="0" y="0"/>
-            <a:ext cx="12192000" cy="6858000"/>
-          </a:xfrm>
-          <a:prstGeom prst="rect">
-            <a:avLst/>
-          </a:prstGeom>
-          <a:gradFill flip="none" rotWithShape="1">
-            <a:gsLst>
-              <a:gs pos="0">
-                <a:srgbClr val="97E4FF"/>
-              </a:gs>
-              <a:gs pos="33000">
-                <a:schemeClr val="bg1">
-                  <a:lumMod val="95000"/>
-                </a:schemeClr>
-              </a:gs>
-              <a:gs pos="100000">
-                <a:schemeClr val="bg1">
-                  <a:lumMod val="95000"/>
-                </a:schemeClr>
-              </a:gs>
-            </a:gsLst>
-            <a:lin ang="5400000" scaled="1"/>
-            <a:tileRect/>
-          </a:gradFill>
-          <a:ln>
-            <a:noFill/>
-          </a:ln>
-        </p:spPr>
-        <p:style>
-          <a:lnRef idx="2">
-            <a:schemeClr val="accent1">
-              <a:shade val="15000"/>
-            </a:schemeClr>
-          </a:lnRef>
-          <a:fillRef idx="1">
-            <a:schemeClr val="accent1"/>
-          </a:fillRef>
-          <a:effectRef idx="0">
-            <a:schemeClr val="accent1"/>
-          </a:effectRef>
-          <a:fontRef idx="minor">
-            <a:schemeClr val="lt1"/>
-          </a:fontRef>
-        </p:style>
-        <p:txBody>
-          <a:bodyPr rtlCol="0" anchor="ctr"/>
-          <a:lstStyle/>
-          <a:p>
-            <a:pPr algn="ctr"/>
-            <a:endParaRPr lang="zh-CN" altLang="en-US"/>
-          </a:p>
-        </p:txBody>
-      </p:sp>
-    </p:spTree>
-    <p:extLst>
-      <p:ext uri="{BB962C8B-B14F-4D97-AF65-F5344CB8AC3E}">
-        <p14:creationId xmlns:p14="http://schemas.microsoft.com/office/powerpoint/2010/main" val="3291498850"/>
-      </p:ext>
-    </p:extLst>
-  </p:cSld>
-  <p:clrMapOvr>
-    <a:masterClrMapping/>
-  </p:clrMapOvr>
-</p:sld>
-</file>
-
-<file path=ppt/slides/slide3.xml><?xml version="1.0" encoding="utf-8"?>
-<p:sld xmlns:a="http://schemas.openxmlformats.org/drawingml/2006/main" xmlns:r="http://schemas.openxmlformats.org/officeDocument/2006/relationships" xmlns:p="http://schemas.openxmlformats.org/presentationml/2006/main">
-  <p:cSld>
-    <p:spTree>
-      <p:nvGrpSpPr>
-        <p:cNvPr id="1" name=""/>
-        <p:cNvGrpSpPr/>
-        <p:nvPr/>
-      </p:nvGrpSpPr>
-      <p:grpSpPr>
-        <a:xfrm>
-          <a:off x="0" y="0"/>
-          <a:ext cx="0" cy="0"/>
-          <a:chOff x="0" y="0"/>
-          <a:chExt cx="0" cy="0"/>
-        </a:xfrm>
-      </p:grpSpPr>
-      <p:sp>
-        <p:nvSpPr>
           <p:cNvPr id="16" name="矩形: 圆角 15">
             <a:extLst>
               <a:ext uri="{FF2B5EF4-FFF2-40B4-BE49-F238E27FC236}">
@@ -5807,7 +5710,7 @@
 </p:sld>
 </file>
 
-<file path=ppt/slides/slide4.xml><?xml version="1.0" encoding="utf-8"?>
+<file path=ppt/slides/slide3.xml><?xml version="1.0" encoding="utf-8"?>
 <p:sld xmlns:a="http://schemas.openxmlformats.org/drawingml/2006/main" xmlns:r="http://schemas.openxmlformats.org/officeDocument/2006/relationships" xmlns:p="http://schemas.openxmlformats.org/presentationml/2006/main">
   <p:cSld>
     <p:spTree>
@@ -5997,7 +5900,7 @@
 </p:sld>
 </file>
 
-<file path=ppt/slides/slide5.xml><?xml version="1.0" encoding="utf-8"?>
+<file path=ppt/slides/slide4.xml><?xml version="1.0" encoding="utf-8"?>
 <p:sld xmlns:a="http://schemas.openxmlformats.org/drawingml/2006/main" xmlns:r="http://schemas.openxmlformats.org/officeDocument/2006/relationships" xmlns:p="http://schemas.openxmlformats.org/presentationml/2006/main">
   <p:cSld>
     <p:spTree>
@@ -6319,6 +6222,3499 @@
 </p:sld>
 </file>
 
+<file path=ppt/slides/slide5.xml><?xml version="1.0" encoding="utf-8"?>
+<p:sld xmlns:a="http://schemas.openxmlformats.org/drawingml/2006/main" xmlns:r="http://schemas.openxmlformats.org/officeDocument/2006/relationships" xmlns:p="http://schemas.openxmlformats.org/presentationml/2006/main">
+  <p:cSld>
+    <p:spTree>
+      <p:nvGrpSpPr>
+        <p:cNvPr id="1" name=""/>
+        <p:cNvGrpSpPr/>
+        <p:nvPr/>
+      </p:nvGrpSpPr>
+      <p:grpSpPr>
+        <a:xfrm>
+          <a:off x="0" y="0"/>
+          <a:ext cx="0" cy="0"/>
+          <a:chOff x="0" y="0"/>
+          <a:chExt cx="0" cy="0"/>
+        </a:xfrm>
+      </p:grpSpPr>
+      <p:sp>
+        <p:nvSpPr>
+          <p:cNvPr id="12" name="矩形 11">
+            <a:extLst>
+              <a:ext uri="{FF2B5EF4-FFF2-40B4-BE49-F238E27FC236}">
+                <a16:creationId xmlns:a16="http://schemas.microsoft.com/office/drawing/2014/main" id="{B981EAB2-36BF-7156-890C-C5C0628C2073}"/>
+              </a:ext>
+            </a:extLst>
+          </p:cNvPr>
+          <p:cNvSpPr/>
+          <p:nvPr/>
+        </p:nvSpPr>
+        <p:spPr>
+          <a:xfrm>
+            <a:off x="0" y="0"/>
+            <a:ext cx="12192000" cy="6858000"/>
+          </a:xfrm>
+          <a:prstGeom prst="rect">
+            <a:avLst/>
+          </a:prstGeom>
+          <a:gradFill flip="none" rotWithShape="1">
+            <a:gsLst>
+              <a:gs pos="0">
+                <a:srgbClr val="AFEAFF"/>
+              </a:gs>
+              <a:gs pos="100000">
+                <a:srgbClr val="85DFFF"/>
+              </a:gs>
+            </a:gsLst>
+            <a:path path="circle">
+              <a:fillToRect l="50000" t="50000" r="50000" b="50000"/>
+            </a:path>
+            <a:tileRect/>
+          </a:gradFill>
+          <a:ln>
+            <a:noFill/>
+          </a:ln>
+        </p:spPr>
+        <p:style>
+          <a:lnRef idx="2">
+            <a:schemeClr val="accent1">
+              <a:shade val="15000"/>
+            </a:schemeClr>
+          </a:lnRef>
+          <a:fillRef idx="1">
+            <a:schemeClr val="accent1"/>
+          </a:fillRef>
+          <a:effectRef idx="0">
+            <a:schemeClr val="accent1"/>
+          </a:effectRef>
+          <a:fontRef idx="minor">
+            <a:schemeClr val="lt1"/>
+          </a:fontRef>
+        </p:style>
+        <p:txBody>
+          <a:bodyPr rtlCol="0" anchor="ctr"/>
+          <a:lstStyle/>
+          <a:p>
+            <a:pPr algn="ctr"/>
+            <a:endParaRPr lang="zh-CN" altLang="en-US"/>
+          </a:p>
+        </p:txBody>
+      </p:sp>
+      <p:grpSp>
+        <p:nvGrpSpPr>
+          <p:cNvPr id="25" name="组合 24">
+            <a:extLst>
+              <a:ext uri="{FF2B5EF4-FFF2-40B4-BE49-F238E27FC236}">
+                <a16:creationId xmlns:a16="http://schemas.microsoft.com/office/drawing/2014/main" id="{8F55D4E2-AB49-4A84-7F36-DE6BDFA4A5D3}"/>
+              </a:ext>
+            </a:extLst>
+          </p:cNvPr>
+          <p:cNvGrpSpPr/>
+          <p:nvPr/>
+        </p:nvGrpSpPr>
+        <p:grpSpPr>
+          <a:xfrm>
+            <a:off x="3263928" y="1917289"/>
+            <a:ext cx="5664144" cy="3021042"/>
+            <a:chOff x="3211272" y="3880502"/>
+            <a:chExt cx="5664144" cy="3021042"/>
+          </a:xfrm>
+          <a:effectLst/>
+        </p:grpSpPr>
+        <p:grpSp>
+          <p:nvGrpSpPr>
+            <p:cNvPr id="19" name="组合 18">
+              <a:extLst>
+                <a:ext uri="{FF2B5EF4-FFF2-40B4-BE49-F238E27FC236}">
+                  <a16:creationId xmlns:a16="http://schemas.microsoft.com/office/drawing/2014/main" id="{5A5CC7E4-C893-5732-0BA9-042A6ED8A6D8}"/>
+                </a:ext>
+              </a:extLst>
+            </p:cNvPr>
+            <p:cNvGrpSpPr/>
+            <p:nvPr/>
+          </p:nvGrpSpPr>
+          <p:grpSpPr>
+            <a:xfrm>
+              <a:off x="5551713" y="3880502"/>
+              <a:ext cx="3323703" cy="2994903"/>
+              <a:chOff x="5551713" y="3880502"/>
+              <a:chExt cx="3323703" cy="2994903"/>
+            </a:xfrm>
+          </p:grpSpPr>
+          <p:sp>
+            <p:nvSpPr>
+              <p:cNvPr id="18" name="任意多边形: 形状 17">
+                <a:extLst>
+                  <a:ext uri="{FF2B5EF4-FFF2-40B4-BE49-F238E27FC236}">
+                    <a16:creationId xmlns:a16="http://schemas.microsoft.com/office/drawing/2014/main" id="{94D532BC-CBFA-7277-D5F1-49C519F40840}"/>
+                  </a:ext>
+                </a:extLst>
+              </p:cNvPr>
+              <p:cNvSpPr/>
+              <p:nvPr/>
+            </p:nvSpPr>
+            <p:spPr>
+              <a:xfrm rot="4731122">
+                <a:off x="6939092" y="4939081"/>
+                <a:ext cx="1088572" cy="2784076"/>
+              </a:xfrm>
+              <a:custGeom>
+                <a:avLst/>
+                <a:gdLst>
+                  <a:gd name="connsiteX0" fmla="*/ 544286 w 1088572"/>
+                  <a:gd name="connsiteY0" fmla="*/ 0 h 2784076"/>
+                  <a:gd name="connsiteX1" fmla="*/ 617933 w 1088572"/>
+                  <a:gd name="connsiteY1" fmla="*/ 81032 h 2784076"/>
+                  <a:gd name="connsiteX2" fmla="*/ 1088572 w 1088572"/>
+                  <a:gd name="connsiteY2" fmla="*/ 1392038 h 2784076"/>
+                  <a:gd name="connsiteX3" fmla="*/ 617933 w 1088572"/>
+                  <a:gd name="connsiteY3" fmla="*/ 2703044 h 2784076"/>
+                  <a:gd name="connsiteX4" fmla="*/ 544286 w 1088572"/>
+                  <a:gd name="connsiteY4" fmla="*/ 2784076 h 2784076"/>
+                  <a:gd name="connsiteX5" fmla="*/ 470639 w 1088572"/>
+                  <a:gd name="connsiteY5" fmla="*/ 2703044 h 2784076"/>
+                  <a:gd name="connsiteX6" fmla="*/ 0 w 1088572"/>
+                  <a:gd name="connsiteY6" fmla="*/ 1392038 h 2784076"/>
+                  <a:gd name="connsiteX7" fmla="*/ 470639 w 1088572"/>
+                  <a:gd name="connsiteY7" fmla="*/ 81032 h 2784076"/>
+                </a:gdLst>
+                <a:ahLst/>
+                <a:cxnLst>
+                  <a:cxn ang="0">
+                    <a:pos x="connsiteX0" y="connsiteY0"/>
+                  </a:cxn>
+                  <a:cxn ang="0">
+                    <a:pos x="connsiteX1" y="connsiteY1"/>
+                  </a:cxn>
+                  <a:cxn ang="0">
+                    <a:pos x="connsiteX2" y="connsiteY2"/>
+                  </a:cxn>
+                  <a:cxn ang="0">
+                    <a:pos x="connsiteX3" y="connsiteY3"/>
+                  </a:cxn>
+                  <a:cxn ang="0">
+                    <a:pos x="connsiteX4" y="connsiteY4"/>
+                  </a:cxn>
+                  <a:cxn ang="0">
+                    <a:pos x="connsiteX5" y="connsiteY5"/>
+                  </a:cxn>
+                  <a:cxn ang="0">
+                    <a:pos x="connsiteX6" y="connsiteY6"/>
+                  </a:cxn>
+                  <a:cxn ang="0">
+                    <a:pos x="connsiteX7" y="connsiteY7"/>
+                  </a:cxn>
+                </a:cxnLst>
+                <a:rect l="l" t="t" r="r" b="b"/>
+                <a:pathLst>
+                  <a:path w="1088572" h="2784076">
+                    <a:moveTo>
+                      <a:pt x="544286" y="0"/>
+                    </a:moveTo>
+                    <a:lnTo>
+                      <a:pt x="617933" y="81032"/>
+                    </a:lnTo>
+                    <a:cubicBezTo>
+                      <a:pt x="911951" y="437300"/>
+                      <a:pt x="1088572" y="894043"/>
+                      <a:pt x="1088572" y="1392038"/>
+                    </a:cubicBezTo>
+                    <a:cubicBezTo>
+                      <a:pt x="1088572" y="1890034"/>
+                      <a:pt x="911951" y="2346777"/>
+                      <a:pt x="617933" y="2703044"/>
+                    </a:cubicBezTo>
+                    <a:lnTo>
+                      <a:pt x="544286" y="2784076"/>
+                    </a:lnTo>
+                    <a:lnTo>
+                      <a:pt x="470639" y="2703044"/>
+                    </a:lnTo>
+                    <a:cubicBezTo>
+                      <a:pt x="176621" y="2346777"/>
+                      <a:pt x="0" y="1890034"/>
+                      <a:pt x="0" y="1392038"/>
+                    </a:cubicBezTo>
+                    <a:cubicBezTo>
+                      <a:pt x="0" y="894043"/>
+                      <a:pt x="176621" y="437300"/>
+                      <a:pt x="470639" y="81032"/>
+                    </a:cubicBezTo>
+                    <a:close/>
+                  </a:path>
+                </a:pathLst>
+              </a:custGeom>
+              <a:gradFill flip="none" rotWithShape="1">
+                <a:gsLst>
+                  <a:gs pos="0">
+                    <a:srgbClr val="85DFFF"/>
+                  </a:gs>
+                  <a:gs pos="100000">
+                    <a:schemeClr val="bg1"/>
+                  </a:gs>
+                </a:gsLst>
+                <a:path path="circle">
+                  <a:fillToRect l="100000" t="100000"/>
+                </a:path>
+                <a:tileRect r="-100000" b="-100000"/>
+              </a:gradFill>
+              <a:ln>
+                <a:noFill/>
+              </a:ln>
+            </p:spPr>
+            <p:style>
+              <a:lnRef idx="2">
+                <a:schemeClr val="accent1">
+                  <a:shade val="15000"/>
+                </a:schemeClr>
+              </a:lnRef>
+              <a:fillRef idx="1">
+                <a:schemeClr val="accent1"/>
+              </a:fillRef>
+              <a:effectRef idx="0">
+                <a:schemeClr val="accent1"/>
+              </a:effectRef>
+              <a:fontRef idx="minor">
+                <a:schemeClr val="lt1"/>
+              </a:fontRef>
+            </p:style>
+            <p:txBody>
+              <a:bodyPr wrap="square" rtlCol="0" anchor="ctr">
+                <a:noAutofit/>
+              </a:bodyPr>
+              <a:lstStyle/>
+              <a:p>
+                <a:pPr algn="ctr"/>
+                <a:endParaRPr lang="zh-CN" altLang="en-US"/>
+              </a:p>
+            </p:txBody>
+          </p:sp>
+          <p:sp>
+            <p:nvSpPr>
+              <p:cNvPr id="15" name="任意多边形: 形状 14">
+                <a:extLst>
+                  <a:ext uri="{FF2B5EF4-FFF2-40B4-BE49-F238E27FC236}">
+                    <a16:creationId xmlns:a16="http://schemas.microsoft.com/office/drawing/2014/main" id="{D113332C-0CE6-EABA-C761-CF48E30A2BD6}"/>
+                  </a:ext>
+                </a:extLst>
+              </p:cNvPr>
+              <p:cNvSpPr/>
+              <p:nvPr/>
+            </p:nvSpPr>
+            <p:spPr>
+              <a:xfrm rot="2988853">
+                <a:off x="6626487" y="4399162"/>
+                <a:ext cx="1088572" cy="2784076"/>
+              </a:xfrm>
+              <a:custGeom>
+                <a:avLst/>
+                <a:gdLst>
+                  <a:gd name="connsiteX0" fmla="*/ 544286 w 1088572"/>
+                  <a:gd name="connsiteY0" fmla="*/ 0 h 2784076"/>
+                  <a:gd name="connsiteX1" fmla="*/ 617933 w 1088572"/>
+                  <a:gd name="connsiteY1" fmla="*/ 81032 h 2784076"/>
+                  <a:gd name="connsiteX2" fmla="*/ 1088572 w 1088572"/>
+                  <a:gd name="connsiteY2" fmla="*/ 1392038 h 2784076"/>
+                  <a:gd name="connsiteX3" fmla="*/ 617933 w 1088572"/>
+                  <a:gd name="connsiteY3" fmla="*/ 2703044 h 2784076"/>
+                  <a:gd name="connsiteX4" fmla="*/ 544286 w 1088572"/>
+                  <a:gd name="connsiteY4" fmla="*/ 2784076 h 2784076"/>
+                  <a:gd name="connsiteX5" fmla="*/ 470639 w 1088572"/>
+                  <a:gd name="connsiteY5" fmla="*/ 2703044 h 2784076"/>
+                  <a:gd name="connsiteX6" fmla="*/ 0 w 1088572"/>
+                  <a:gd name="connsiteY6" fmla="*/ 1392038 h 2784076"/>
+                  <a:gd name="connsiteX7" fmla="*/ 470639 w 1088572"/>
+                  <a:gd name="connsiteY7" fmla="*/ 81032 h 2784076"/>
+                </a:gdLst>
+                <a:ahLst/>
+                <a:cxnLst>
+                  <a:cxn ang="0">
+                    <a:pos x="connsiteX0" y="connsiteY0"/>
+                  </a:cxn>
+                  <a:cxn ang="0">
+                    <a:pos x="connsiteX1" y="connsiteY1"/>
+                  </a:cxn>
+                  <a:cxn ang="0">
+                    <a:pos x="connsiteX2" y="connsiteY2"/>
+                  </a:cxn>
+                  <a:cxn ang="0">
+                    <a:pos x="connsiteX3" y="connsiteY3"/>
+                  </a:cxn>
+                  <a:cxn ang="0">
+                    <a:pos x="connsiteX4" y="connsiteY4"/>
+                  </a:cxn>
+                  <a:cxn ang="0">
+                    <a:pos x="connsiteX5" y="connsiteY5"/>
+                  </a:cxn>
+                  <a:cxn ang="0">
+                    <a:pos x="connsiteX6" y="connsiteY6"/>
+                  </a:cxn>
+                  <a:cxn ang="0">
+                    <a:pos x="connsiteX7" y="connsiteY7"/>
+                  </a:cxn>
+                </a:cxnLst>
+                <a:rect l="l" t="t" r="r" b="b"/>
+                <a:pathLst>
+                  <a:path w="1088572" h="2784076">
+                    <a:moveTo>
+                      <a:pt x="544286" y="0"/>
+                    </a:moveTo>
+                    <a:lnTo>
+                      <a:pt x="617933" y="81032"/>
+                    </a:lnTo>
+                    <a:cubicBezTo>
+                      <a:pt x="911951" y="437300"/>
+                      <a:pt x="1088572" y="894043"/>
+                      <a:pt x="1088572" y="1392038"/>
+                    </a:cubicBezTo>
+                    <a:cubicBezTo>
+                      <a:pt x="1088572" y="1890034"/>
+                      <a:pt x="911951" y="2346777"/>
+                      <a:pt x="617933" y="2703044"/>
+                    </a:cubicBezTo>
+                    <a:lnTo>
+                      <a:pt x="544286" y="2784076"/>
+                    </a:lnTo>
+                    <a:lnTo>
+                      <a:pt x="470639" y="2703044"/>
+                    </a:lnTo>
+                    <a:cubicBezTo>
+                      <a:pt x="176621" y="2346777"/>
+                      <a:pt x="0" y="1890034"/>
+                      <a:pt x="0" y="1392038"/>
+                    </a:cubicBezTo>
+                    <a:cubicBezTo>
+                      <a:pt x="0" y="894043"/>
+                      <a:pt x="176621" y="437300"/>
+                      <a:pt x="470639" y="81032"/>
+                    </a:cubicBezTo>
+                    <a:close/>
+                  </a:path>
+                </a:pathLst>
+              </a:custGeom>
+              <a:gradFill flip="none" rotWithShape="1">
+                <a:gsLst>
+                  <a:gs pos="0">
+                    <a:srgbClr val="85DFFF"/>
+                  </a:gs>
+                  <a:gs pos="100000">
+                    <a:schemeClr val="bg1"/>
+                  </a:gs>
+                </a:gsLst>
+                <a:path path="circle">
+                  <a:fillToRect l="100000" t="100000"/>
+                </a:path>
+                <a:tileRect r="-100000" b="-100000"/>
+              </a:gradFill>
+              <a:ln>
+                <a:noFill/>
+              </a:ln>
+            </p:spPr>
+            <p:style>
+              <a:lnRef idx="2">
+                <a:schemeClr val="accent1">
+                  <a:shade val="15000"/>
+                </a:schemeClr>
+              </a:lnRef>
+              <a:fillRef idx="1">
+                <a:schemeClr val="accent1"/>
+              </a:fillRef>
+              <a:effectRef idx="0">
+                <a:schemeClr val="accent1"/>
+              </a:effectRef>
+              <a:fontRef idx="minor">
+                <a:schemeClr val="lt1"/>
+              </a:fontRef>
+            </p:style>
+            <p:txBody>
+              <a:bodyPr wrap="square" rtlCol="0" anchor="ctr">
+                <a:noAutofit/>
+              </a:bodyPr>
+              <a:lstStyle/>
+              <a:p>
+                <a:pPr algn="ctr"/>
+                <a:endParaRPr lang="zh-CN" altLang="en-US" dirty="0"/>
+              </a:p>
+            </p:txBody>
+          </p:sp>
+          <p:sp>
+            <p:nvSpPr>
+              <p:cNvPr id="16" name="任意多边形: 形状 15">
+                <a:extLst>
+                  <a:ext uri="{FF2B5EF4-FFF2-40B4-BE49-F238E27FC236}">
+                    <a16:creationId xmlns:a16="http://schemas.microsoft.com/office/drawing/2014/main" id="{080863DF-3A3A-0C13-65CF-88CDF3563234}"/>
+                  </a:ext>
+                </a:extLst>
+              </p:cNvPr>
+              <p:cNvSpPr/>
+              <p:nvPr/>
+            </p:nvSpPr>
+            <p:spPr>
+              <a:xfrm rot="1356476">
+                <a:off x="6226332" y="3971657"/>
+                <a:ext cx="1088572" cy="2784076"/>
+              </a:xfrm>
+              <a:custGeom>
+                <a:avLst/>
+                <a:gdLst>
+                  <a:gd name="connsiteX0" fmla="*/ 544286 w 1088572"/>
+                  <a:gd name="connsiteY0" fmla="*/ 0 h 2784076"/>
+                  <a:gd name="connsiteX1" fmla="*/ 617933 w 1088572"/>
+                  <a:gd name="connsiteY1" fmla="*/ 81032 h 2784076"/>
+                  <a:gd name="connsiteX2" fmla="*/ 1088572 w 1088572"/>
+                  <a:gd name="connsiteY2" fmla="*/ 1392038 h 2784076"/>
+                  <a:gd name="connsiteX3" fmla="*/ 617933 w 1088572"/>
+                  <a:gd name="connsiteY3" fmla="*/ 2703044 h 2784076"/>
+                  <a:gd name="connsiteX4" fmla="*/ 544286 w 1088572"/>
+                  <a:gd name="connsiteY4" fmla="*/ 2784076 h 2784076"/>
+                  <a:gd name="connsiteX5" fmla="*/ 470639 w 1088572"/>
+                  <a:gd name="connsiteY5" fmla="*/ 2703044 h 2784076"/>
+                  <a:gd name="connsiteX6" fmla="*/ 0 w 1088572"/>
+                  <a:gd name="connsiteY6" fmla="*/ 1392038 h 2784076"/>
+                  <a:gd name="connsiteX7" fmla="*/ 470639 w 1088572"/>
+                  <a:gd name="connsiteY7" fmla="*/ 81032 h 2784076"/>
+                </a:gdLst>
+                <a:ahLst/>
+                <a:cxnLst>
+                  <a:cxn ang="0">
+                    <a:pos x="connsiteX0" y="connsiteY0"/>
+                  </a:cxn>
+                  <a:cxn ang="0">
+                    <a:pos x="connsiteX1" y="connsiteY1"/>
+                  </a:cxn>
+                  <a:cxn ang="0">
+                    <a:pos x="connsiteX2" y="connsiteY2"/>
+                  </a:cxn>
+                  <a:cxn ang="0">
+                    <a:pos x="connsiteX3" y="connsiteY3"/>
+                  </a:cxn>
+                  <a:cxn ang="0">
+                    <a:pos x="connsiteX4" y="connsiteY4"/>
+                  </a:cxn>
+                  <a:cxn ang="0">
+                    <a:pos x="connsiteX5" y="connsiteY5"/>
+                  </a:cxn>
+                  <a:cxn ang="0">
+                    <a:pos x="connsiteX6" y="connsiteY6"/>
+                  </a:cxn>
+                  <a:cxn ang="0">
+                    <a:pos x="connsiteX7" y="connsiteY7"/>
+                  </a:cxn>
+                </a:cxnLst>
+                <a:rect l="l" t="t" r="r" b="b"/>
+                <a:pathLst>
+                  <a:path w="1088572" h="2784076">
+                    <a:moveTo>
+                      <a:pt x="544286" y="0"/>
+                    </a:moveTo>
+                    <a:lnTo>
+                      <a:pt x="617933" y="81032"/>
+                    </a:lnTo>
+                    <a:cubicBezTo>
+                      <a:pt x="911951" y="437300"/>
+                      <a:pt x="1088572" y="894043"/>
+                      <a:pt x="1088572" y="1392038"/>
+                    </a:cubicBezTo>
+                    <a:cubicBezTo>
+                      <a:pt x="1088572" y="1890034"/>
+                      <a:pt x="911951" y="2346777"/>
+                      <a:pt x="617933" y="2703044"/>
+                    </a:cubicBezTo>
+                    <a:lnTo>
+                      <a:pt x="544286" y="2784076"/>
+                    </a:lnTo>
+                    <a:lnTo>
+                      <a:pt x="470639" y="2703044"/>
+                    </a:lnTo>
+                    <a:cubicBezTo>
+                      <a:pt x="176621" y="2346777"/>
+                      <a:pt x="0" y="1890034"/>
+                      <a:pt x="0" y="1392038"/>
+                    </a:cubicBezTo>
+                    <a:cubicBezTo>
+                      <a:pt x="0" y="894043"/>
+                      <a:pt x="176621" y="437300"/>
+                      <a:pt x="470639" y="81032"/>
+                    </a:cubicBezTo>
+                    <a:close/>
+                  </a:path>
+                </a:pathLst>
+              </a:custGeom>
+              <a:gradFill flip="none" rotWithShape="1">
+                <a:gsLst>
+                  <a:gs pos="0">
+                    <a:srgbClr val="85DFFF"/>
+                  </a:gs>
+                  <a:gs pos="100000">
+                    <a:schemeClr val="bg1"/>
+                  </a:gs>
+                </a:gsLst>
+                <a:path path="circle">
+                  <a:fillToRect l="100000" t="100000"/>
+                </a:path>
+                <a:tileRect r="-100000" b="-100000"/>
+              </a:gradFill>
+              <a:ln>
+                <a:noFill/>
+              </a:ln>
+            </p:spPr>
+            <p:style>
+              <a:lnRef idx="2">
+                <a:schemeClr val="accent1">
+                  <a:shade val="15000"/>
+                </a:schemeClr>
+              </a:lnRef>
+              <a:fillRef idx="1">
+                <a:schemeClr val="accent1"/>
+              </a:fillRef>
+              <a:effectRef idx="0">
+                <a:schemeClr val="accent1"/>
+              </a:effectRef>
+              <a:fontRef idx="minor">
+                <a:schemeClr val="lt1"/>
+              </a:fontRef>
+            </p:style>
+            <p:txBody>
+              <a:bodyPr wrap="square" rtlCol="0" anchor="ctr">
+                <a:noAutofit/>
+              </a:bodyPr>
+              <a:lstStyle/>
+              <a:p>
+                <a:pPr algn="ctr"/>
+                <a:endParaRPr lang="zh-CN" altLang="en-US" dirty="0"/>
+              </a:p>
+            </p:txBody>
+          </p:sp>
+          <p:sp>
+            <p:nvSpPr>
+              <p:cNvPr id="17" name="任意多边形: 形状 16">
+                <a:extLst>
+                  <a:ext uri="{FF2B5EF4-FFF2-40B4-BE49-F238E27FC236}">
+                    <a16:creationId xmlns:a16="http://schemas.microsoft.com/office/drawing/2014/main" id="{3CB14DCD-2D95-7622-6A86-859B36A7E3AB}"/>
+                  </a:ext>
+                </a:extLst>
+              </p:cNvPr>
+              <p:cNvSpPr/>
+              <p:nvPr/>
+            </p:nvSpPr>
+            <p:spPr>
+              <a:xfrm rot="21426923">
+                <a:off x="5551713" y="3880502"/>
+                <a:ext cx="1088572" cy="2784076"/>
+              </a:xfrm>
+              <a:custGeom>
+                <a:avLst/>
+                <a:gdLst>
+                  <a:gd name="connsiteX0" fmla="*/ 544286 w 1088572"/>
+                  <a:gd name="connsiteY0" fmla="*/ 0 h 2784076"/>
+                  <a:gd name="connsiteX1" fmla="*/ 617933 w 1088572"/>
+                  <a:gd name="connsiteY1" fmla="*/ 81032 h 2784076"/>
+                  <a:gd name="connsiteX2" fmla="*/ 1088572 w 1088572"/>
+                  <a:gd name="connsiteY2" fmla="*/ 1392038 h 2784076"/>
+                  <a:gd name="connsiteX3" fmla="*/ 617933 w 1088572"/>
+                  <a:gd name="connsiteY3" fmla="*/ 2703044 h 2784076"/>
+                  <a:gd name="connsiteX4" fmla="*/ 544286 w 1088572"/>
+                  <a:gd name="connsiteY4" fmla="*/ 2784076 h 2784076"/>
+                  <a:gd name="connsiteX5" fmla="*/ 470639 w 1088572"/>
+                  <a:gd name="connsiteY5" fmla="*/ 2703044 h 2784076"/>
+                  <a:gd name="connsiteX6" fmla="*/ 0 w 1088572"/>
+                  <a:gd name="connsiteY6" fmla="*/ 1392038 h 2784076"/>
+                  <a:gd name="connsiteX7" fmla="*/ 470639 w 1088572"/>
+                  <a:gd name="connsiteY7" fmla="*/ 81032 h 2784076"/>
+                </a:gdLst>
+                <a:ahLst/>
+                <a:cxnLst>
+                  <a:cxn ang="0">
+                    <a:pos x="connsiteX0" y="connsiteY0"/>
+                  </a:cxn>
+                  <a:cxn ang="0">
+                    <a:pos x="connsiteX1" y="connsiteY1"/>
+                  </a:cxn>
+                  <a:cxn ang="0">
+                    <a:pos x="connsiteX2" y="connsiteY2"/>
+                  </a:cxn>
+                  <a:cxn ang="0">
+                    <a:pos x="connsiteX3" y="connsiteY3"/>
+                  </a:cxn>
+                  <a:cxn ang="0">
+                    <a:pos x="connsiteX4" y="connsiteY4"/>
+                  </a:cxn>
+                  <a:cxn ang="0">
+                    <a:pos x="connsiteX5" y="connsiteY5"/>
+                  </a:cxn>
+                  <a:cxn ang="0">
+                    <a:pos x="connsiteX6" y="connsiteY6"/>
+                  </a:cxn>
+                  <a:cxn ang="0">
+                    <a:pos x="connsiteX7" y="connsiteY7"/>
+                  </a:cxn>
+                </a:cxnLst>
+                <a:rect l="l" t="t" r="r" b="b"/>
+                <a:pathLst>
+                  <a:path w="1088572" h="2784076">
+                    <a:moveTo>
+                      <a:pt x="544286" y="0"/>
+                    </a:moveTo>
+                    <a:lnTo>
+                      <a:pt x="617933" y="81032"/>
+                    </a:lnTo>
+                    <a:cubicBezTo>
+                      <a:pt x="911951" y="437300"/>
+                      <a:pt x="1088572" y="894043"/>
+                      <a:pt x="1088572" y="1392038"/>
+                    </a:cubicBezTo>
+                    <a:cubicBezTo>
+                      <a:pt x="1088572" y="1890034"/>
+                      <a:pt x="911951" y="2346777"/>
+                      <a:pt x="617933" y="2703044"/>
+                    </a:cubicBezTo>
+                    <a:lnTo>
+                      <a:pt x="544286" y="2784076"/>
+                    </a:lnTo>
+                    <a:lnTo>
+                      <a:pt x="470639" y="2703044"/>
+                    </a:lnTo>
+                    <a:cubicBezTo>
+                      <a:pt x="176621" y="2346777"/>
+                      <a:pt x="0" y="1890034"/>
+                      <a:pt x="0" y="1392038"/>
+                    </a:cubicBezTo>
+                    <a:cubicBezTo>
+                      <a:pt x="0" y="894043"/>
+                      <a:pt x="176621" y="437300"/>
+                      <a:pt x="470639" y="81032"/>
+                    </a:cubicBezTo>
+                    <a:close/>
+                  </a:path>
+                </a:pathLst>
+              </a:custGeom>
+              <a:gradFill flip="none" rotWithShape="1">
+                <a:gsLst>
+                  <a:gs pos="0">
+                    <a:srgbClr val="85DFFF"/>
+                  </a:gs>
+                  <a:gs pos="100000">
+                    <a:schemeClr val="bg1"/>
+                  </a:gs>
+                </a:gsLst>
+                <a:path path="circle">
+                  <a:fillToRect l="100000" t="100000"/>
+                </a:path>
+                <a:tileRect r="-100000" b="-100000"/>
+              </a:gradFill>
+              <a:ln>
+                <a:noFill/>
+              </a:ln>
+            </p:spPr>
+            <p:style>
+              <a:lnRef idx="2">
+                <a:schemeClr val="accent1">
+                  <a:shade val="15000"/>
+                </a:schemeClr>
+              </a:lnRef>
+              <a:fillRef idx="1">
+                <a:schemeClr val="accent1"/>
+              </a:fillRef>
+              <a:effectRef idx="0">
+                <a:schemeClr val="accent1"/>
+              </a:effectRef>
+              <a:fontRef idx="minor">
+                <a:schemeClr val="lt1"/>
+              </a:fontRef>
+            </p:style>
+            <p:txBody>
+              <a:bodyPr wrap="square" rtlCol="0" anchor="ctr">
+                <a:noAutofit/>
+              </a:bodyPr>
+              <a:lstStyle/>
+              <a:p>
+                <a:pPr algn="ctr"/>
+                <a:endParaRPr lang="zh-CN" altLang="en-US"/>
+              </a:p>
+            </p:txBody>
+          </p:sp>
+        </p:grpSp>
+        <p:grpSp>
+          <p:nvGrpSpPr>
+            <p:cNvPr id="20" name="组合 19">
+              <a:extLst>
+                <a:ext uri="{FF2B5EF4-FFF2-40B4-BE49-F238E27FC236}">
+                  <a16:creationId xmlns:a16="http://schemas.microsoft.com/office/drawing/2014/main" id="{1B47DE55-D6A1-BC9C-CC92-5D4AFDCC8905}"/>
+                </a:ext>
+              </a:extLst>
+            </p:cNvPr>
+            <p:cNvGrpSpPr/>
+            <p:nvPr/>
+          </p:nvGrpSpPr>
+          <p:grpSpPr>
+            <a:xfrm flipH="1">
+              <a:off x="3211272" y="3906641"/>
+              <a:ext cx="3323703" cy="2994903"/>
+              <a:chOff x="5551713" y="3880502"/>
+              <a:chExt cx="3323703" cy="2994903"/>
+            </a:xfrm>
+          </p:grpSpPr>
+          <p:sp>
+            <p:nvSpPr>
+              <p:cNvPr id="21" name="任意多边形: 形状 20">
+                <a:extLst>
+                  <a:ext uri="{FF2B5EF4-FFF2-40B4-BE49-F238E27FC236}">
+                    <a16:creationId xmlns:a16="http://schemas.microsoft.com/office/drawing/2014/main" id="{BAE122EE-BE64-7379-D841-3677CFB04197}"/>
+                  </a:ext>
+                </a:extLst>
+              </p:cNvPr>
+              <p:cNvSpPr/>
+              <p:nvPr/>
+            </p:nvSpPr>
+            <p:spPr>
+              <a:xfrm rot="4731122">
+                <a:off x="6939092" y="4939081"/>
+                <a:ext cx="1088572" cy="2784076"/>
+              </a:xfrm>
+              <a:custGeom>
+                <a:avLst/>
+                <a:gdLst>
+                  <a:gd name="connsiteX0" fmla="*/ 544286 w 1088572"/>
+                  <a:gd name="connsiteY0" fmla="*/ 0 h 2784076"/>
+                  <a:gd name="connsiteX1" fmla="*/ 617933 w 1088572"/>
+                  <a:gd name="connsiteY1" fmla="*/ 81032 h 2784076"/>
+                  <a:gd name="connsiteX2" fmla="*/ 1088572 w 1088572"/>
+                  <a:gd name="connsiteY2" fmla="*/ 1392038 h 2784076"/>
+                  <a:gd name="connsiteX3" fmla="*/ 617933 w 1088572"/>
+                  <a:gd name="connsiteY3" fmla="*/ 2703044 h 2784076"/>
+                  <a:gd name="connsiteX4" fmla="*/ 544286 w 1088572"/>
+                  <a:gd name="connsiteY4" fmla="*/ 2784076 h 2784076"/>
+                  <a:gd name="connsiteX5" fmla="*/ 470639 w 1088572"/>
+                  <a:gd name="connsiteY5" fmla="*/ 2703044 h 2784076"/>
+                  <a:gd name="connsiteX6" fmla="*/ 0 w 1088572"/>
+                  <a:gd name="connsiteY6" fmla="*/ 1392038 h 2784076"/>
+                  <a:gd name="connsiteX7" fmla="*/ 470639 w 1088572"/>
+                  <a:gd name="connsiteY7" fmla="*/ 81032 h 2784076"/>
+                </a:gdLst>
+                <a:ahLst/>
+                <a:cxnLst>
+                  <a:cxn ang="0">
+                    <a:pos x="connsiteX0" y="connsiteY0"/>
+                  </a:cxn>
+                  <a:cxn ang="0">
+                    <a:pos x="connsiteX1" y="connsiteY1"/>
+                  </a:cxn>
+                  <a:cxn ang="0">
+                    <a:pos x="connsiteX2" y="connsiteY2"/>
+                  </a:cxn>
+                  <a:cxn ang="0">
+                    <a:pos x="connsiteX3" y="connsiteY3"/>
+                  </a:cxn>
+                  <a:cxn ang="0">
+                    <a:pos x="connsiteX4" y="connsiteY4"/>
+                  </a:cxn>
+                  <a:cxn ang="0">
+                    <a:pos x="connsiteX5" y="connsiteY5"/>
+                  </a:cxn>
+                  <a:cxn ang="0">
+                    <a:pos x="connsiteX6" y="connsiteY6"/>
+                  </a:cxn>
+                  <a:cxn ang="0">
+                    <a:pos x="connsiteX7" y="connsiteY7"/>
+                  </a:cxn>
+                </a:cxnLst>
+                <a:rect l="l" t="t" r="r" b="b"/>
+                <a:pathLst>
+                  <a:path w="1088572" h="2784076">
+                    <a:moveTo>
+                      <a:pt x="544286" y="0"/>
+                    </a:moveTo>
+                    <a:lnTo>
+                      <a:pt x="617933" y="81032"/>
+                    </a:lnTo>
+                    <a:cubicBezTo>
+                      <a:pt x="911951" y="437300"/>
+                      <a:pt x="1088572" y="894043"/>
+                      <a:pt x="1088572" y="1392038"/>
+                    </a:cubicBezTo>
+                    <a:cubicBezTo>
+                      <a:pt x="1088572" y="1890034"/>
+                      <a:pt x="911951" y="2346777"/>
+                      <a:pt x="617933" y="2703044"/>
+                    </a:cubicBezTo>
+                    <a:lnTo>
+                      <a:pt x="544286" y="2784076"/>
+                    </a:lnTo>
+                    <a:lnTo>
+                      <a:pt x="470639" y="2703044"/>
+                    </a:lnTo>
+                    <a:cubicBezTo>
+                      <a:pt x="176621" y="2346777"/>
+                      <a:pt x="0" y="1890034"/>
+                      <a:pt x="0" y="1392038"/>
+                    </a:cubicBezTo>
+                    <a:cubicBezTo>
+                      <a:pt x="0" y="894043"/>
+                      <a:pt x="176621" y="437300"/>
+                      <a:pt x="470639" y="81032"/>
+                    </a:cubicBezTo>
+                    <a:close/>
+                  </a:path>
+                </a:pathLst>
+              </a:custGeom>
+              <a:gradFill flip="none" rotWithShape="1">
+                <a:gsLst>
+                  <a:gs pos="0">
+                    <a:srgbClr val="85DFFF"/>
+                  </a:gs>
+                  <a:gs pos="100000">
+                    <a:schemeClr val="bg1"/>
+                  </a:gs>
+                </a:gsLst>
+                <a:path path="circle">
+                  <a:fillToRect l="100000" t="100000"/>
+                </a:path>
+                <a:tileRect r="-100000" b="-100000"/>
+              </a:gradFill>
+              <a:ln>
+                <a:noFill/>
+              </a:ln>
+            </p:spPr>
+            <p:style>
+              <a:lnRef idx="2">
+                <a:schemeClr val="accent1">
+                  <a:shade val="15000"/>
+                </a:schemeClr>
+              </a:lnRef>
+              <a:fillRef idx="1">
+                <a:schemeClr val="accent1"/>
+              </a:fillRef>
+              <a:effectRef idx="0">
+                <a:schemeClr val="accent1"/>
+              </a:effectRef>
+              <a:fontRef idx="minor">
+                <a:schemeClr val="lt1"/>
+              </a:fontRef>
+            </p:style>
+            <p:txBody>
+              <a:bodyPr wrap="square" rtlCol="0" anchor="ctr">
+                <a:noAutofit/>
+              </a:bodyPr>
+              <a:lstStyle/>
+              <a:p>
+                <a:pPr algn="ctr"/>
+                <a:endParaRPr lang="zh-CN" altLang="en-US"/>
+              </a:p>
+            </p:txBody>
+          </p:sp>
+          <p:sp>
+            <p:nvSpPr>
+              <p:cNvPr id="22" name="任意多边形: 形状 21">
+                <a:extLst>
+                  <a:ext uri="{FF2B5EF4-FFF2-40B4-BE49-F238E27FC236}">
+                    <a16:creationId xmlns:a16="http://schemas.microsoft.com/office/drawing/2014/main" id="{D4654661-CD56-1ACB-70C2-A983FCBC9746}"/>
+                  </a:ext>
+                </a:extLst>
+              </p:cNvPr>
+              <p:cNvSpPr/>
+              <p:nvPr/>
+            </p:nvSpPr>
+            <p:spPr>
+              <a:xfrm rot="2988853">
+                <a:off x="6626487" y="4399162"/>
+                <a:ext cx="1088572" cy="2784076"/>
+              </a:xfrm>
+              <a:custGeom>
+                <a:avLst/>
+                <a:gdLst>
+                  <a:gd name="connsiteX0" fmla="*/ 544286 w 1088572"/>
+                  <a:gd name="connsiteY0" fmla="*/ 0 h 2784076"/>
+                  <a:gd name="connsiteX1" fmla="*/ 617933 w 1088572"/>
+                  <a:gd name="connsiteY1" fmla="*/ 81032 h 2784076"/>
+                  <a:gd name="connsiteX2" fmla="*/ 1088572 w 1088572"/>
+                  <a:gd name="connsiteY2" fmla="*/ 1392038 h 2784076"/>
+                  <a:gd name="connsiteX3" fmla="*/ 617933 w 1088572"/>
+                  <a:gd name="connsiteY3" fmla="*/ 2703044 h 2784076"/>
+                  <a:gd name="connsiteX4" fmla="*/ 544286 w 1088572"/>
+                  <a:gd name="connsiteY4" fmla="*/ 2784076 h 2784076"/>
+                  <a:gd name="connsiteX5" fmla="*/ 470639 w 1088572"/>
+                  <a:gd name="connsiteY5" fmla="*/ 2703044 h 2784076"/>
+                  <a:gd name="connsiteX6" fmla="*/ 0 w 1088572"/>
+                  <a:gd name="connsiteY6" fmla="*/ 1392038 h 2784076"/>
+                  <a:gd name="connsiteX7" fmla="*/ 470639 w 1088572"/>
+                  <a:gd name="connsiteY7" fmla="*/ 81032 h 2784076"/>
+                </a:gdLst>
+                <a:ahLst/>
+                <a:cxnLst>
+                  <a:cxn ang="0">
+                    <a:pos x="connsiteX0" y="connsiteY0"/>
+                  </a:cxn>
+                  <a:cxn ang="0">
+                    <a:pos x="connsiteX1" y="connsiteY1"/>
+                  </a:cxn>
+                  <a:cxn ang="0">
+                    <a:pos x="connsiteX2" y="connsiteY2"/>
+                  </a:cxn>
+                  <a:cxn ang="0">
+                    <a:pos x="connsiteX3" y="connsiteY3"/>
+                  </a:cxn>
+                  <a:cxn ang="0">
+                    <a:pos x="connsiteX4" y="connsiteY4"/>
+                  </a:cxn>
+                  <a:cxn ang="0">
+                    <a:pos x="connsiteX5" y="connsiteY5"/>
+                  </a:cxn>
+                  <a:cxn ang="0">
+                    <a:pos x="connsiteX6" y="connsiteY6"/>
+                  </a:cxn>
+                  <a:cxn ang="0">
+                    <a:pos x="connsiteX7" y="connsiteY7"/>
+                  </a:cxn>
+                </a:cxnLst>
+                <a:rect l="l" t="t" r="r" b="b"/>
+                <a:pathLst>
+                  <a:path w="1088572" h="2784076">
+                    <a:moveTo>
+                      <a:pt x="544286" y="0"/>
+                    </a:moveTo>
+                    <a:lnTo>
+                      <a:pt x="617933" y="81032"/>
+                    </a:lnTo>
+                    <a:cubicBezTo>
+                      <a:pt x="911951" y="437300"/>
+                      <a:pt x="1088572" y="894043"/>
+                      <a:pt x="1088572" y="1392038"/>
+                    </a:cubicBezTo>
+                    <a:cubicBezTo>
+                      <a:pt x="1088572" y="1890034"/>
+                      <a:pt x="911951" y="2346777"/>
+                      <a:pt x="617933" y="2703044"/>
+                    </a:cubicBezTo>
+                    <a:lnTo>
+                      <a:pt x="544286" y="2784076"/>
+                    </a:lnTo>
+                    <a:lnTo>
+                      <a:pt x="470639" y="2703044"/>
+                    </a:lnTo>
+                    <a:cubicBezTo>
+                      <a:pt x="176621" y="2346777"/>
+                      <a:pt x="0" y="1890034"/>
+                      <a:pt x="0" y="1392038"/>
+                    </a:cubicBezTo>
+                    <a:cubicBezTo>
+                      <a:pt x="0" y="894043"/>
+                      <a:pt x="176621" y="437300"/>
+                      <a:pt x="470639" y="81032"/>
+                    </a:cubicBezTo>
+                    <a:close/>
+                  </a:path>
+                </a:pathLst>
+              </a:custGeom>
+              <a:gradFill flip="none" rotWithShape="1">
+                <a:gsLst>
+                  <a:gs pos="0">
+                    <a:srgbClr val="85DFFF"/>
+                  </a:gs>
+                  <a:gs pos="100000">
+                    <a:schemeClr val="bg1"/>
+                  </a:gs>
+                </a:gsLst>
+                <a:path path="circle">
+                  <a:fillToRect l="100000" t="100000"/>
+                </a:path>
+                <a:tileRect r="-100000" b="-100000"/>
+              </a:gradFill>
+              <a:ln>
+                <a:noFill/>
+              </a:ln>
+            </p:spPr>
+            <p:style>
+              <a:lnRef idx="2">
+                <a:schemeClr val="accent1">
+                  <a:shade val="15000"/>
+                </a:schemeClr>
+              </a:lnRef>
+              <a:fillRef idx="1">
+                <a:schemeClr val="accent1"/>
+              </a:fillRef>
+              <a:effectRef idx="0">
+                <a:schemeClr val="accent1"/>
+              </a:effectRef>
+              <a:fontRef idx="minor">
+                <a:schemeClr val="lt1"/>
+              </a:fontRef>
+            </p:style>
+            <p:txBody>
+              <a:bodyPr wrap="square" rtlCol="0" anchor="ctr">
+                <a:noAutofit/>
+              </a:bodyPr>
+              <a:lstStyle/>
+              <a:p>
+                <a:pPr algn="ctr"/>
+                <a:endParaRPr lang="zh-CN" altLang="en-US"/>
+              </a:p>
+            </p:txBody>
+          </p:sp>
+          <p:sp>
+            <p:nvSpPr>
+              <p:cNvPr id="23" name="任意多边形: 形状 22">
+                <a:extLst>
+                  <a:ext uri="{FF2B5EF4-FFF2-40B4-BE49-F238E27FC236}">
+                    <a16:creationId xmlns:a16="http://schemas.microsoft.com/office/drawing/2014/main" id="{F8A65C29-52C1-952D-7A56-F88BDA2EDC45}"/>
+                  </a:ext>
+                </a:extLst>
+              </p:cNvPr>
+              <p:cNvSpPr/>
+              <p:nvPr/>
+            </p:nvSpPr>
+            <p:spPr>
+              <a:xfrm rot="1356476">
+                <a:off x="6226332" y="3971657"/>
+                <a:ext cx="1088572" cy="2784076"/>
+              </a:xfrm>
+              <a:custGeom>
+                <a:avLst/>
+                <a:gdLst>
+                  <a:gd name="connsiteX0" fmla="*/ 544286 w 1088572"/>
+                  <a:gd name="connsiteY0" fmla="*/ 0 h 2784076"/>
+                  <a:gd name="connsiteX1" fmla="*/ 617933 w 1088572"/>
+                  <a:gd name="connsiteY1" fmla="*/ 81032 h 2784076"/>
+                  <a:gd name="connsiteX2" fmla="*/ 1088572 w 1088572"/>
+                  <a:gd name="connsiteY2" fmla="*/ 1392038 h 2784076"/>
+                  <a:gd name="connsiteX3" fmla="*/ 617933 w 1088572"/>
+                  <a:gd name="connsiteY3" fmla="*/ 2703044 h 2784076"/>
+                  <a:gd name="connsiteX4" fmla="*/ 544286 w 1088572"/>
+                  <a:gd name="connsiteY4" fmla="*/ 2784076 h 2784076"/>
+                  <a:gd name="connsiteX5" fmla="*/ 470639 w 1088572"/>
+                  <a:gd name="connsiteY5" fmla="*/ 2703044 h 2784076"/>
+                  <a:gd name="connsiteX6" fmla="*/ 0 w 1088572"/>
+                  <a:gd name="connsiteY6" fmla="*/ 1392038 h 2784076"/>
+                  <a:gd name="connsiteX7" fmla="*/ 470639 w 1088572"/>
+                  <a:gd name="connsiteY7" fmla="*/ 81032 h 2784076"/>
+                </a:gdLst>
+                <a:ahLst/>
+                <a:cxnLst>
+                  <a:cxn ang="0">
+                    <a:pos x="connsiteX0" y="connsiteY0"/>
+                  </a:cxn>
+                  <a:cxn ang="0">
+                    <a:pos x="connsiteX1" y="connsiteY1"/>
+                  </a:cxn>
+                  <a:cxn ang="0">
+                    <a:pos x="connsiteX2" y="connsiteY2"/>
+                  </a:cxn>
+                  <a:cxn ang="0">
+                    <a:pos x="connsiteX3" y="connsiteY3"/>
+                  </a:cxn>
+                  <a:cxn ang="0">
+                    <a:pos x="connsiteX4" y="connsiteY4"/>
+                  </a:cxn>
+                  <a:cxn ang="0">
+                    <a:pos x="connsiteX5" y="connsiteY5"/>
+                  </a:cxn>
+                  <a:cxn ang="0">
+                    <a:pos x="connsiteX6" y="connsiteY6"/>
+                  </a:cxn>
+                  <a:cxn ang="0">
+                    <a:pos x="connsiteX7" y="connsiteY7"/>
+                  </a:cxn>
+                </a:cxnLst>
+                <a:rect l="l" t="t" r="r" b="b"/>
+                <a:pathLst>
+                  <a:path w="1088572" h="2784076">
+                    <a:moveTo>
+                      <a:pt x="544286" y="0"/>
+                    </a:moveTo>
+                    <a:lnTo>
+                      <a:pt x="617933" y="81032"/>
+                    </a:lnTo>
+                    <a:cubicBezTo>
+                      <a:pt x="911951" y="437300"/>
+                      <a:pt x="1088572" y="894043"/>
+                      <a:pt x="1088572" y="1392038"/>
+                    </a:cubicBezTo>
+                    <a:cubicBezTo>
+                      <a:pt x="1088572" y="1890034"/>
+                      <a:pt x="911951" y="2346777"/>
+                      <a:pt x="617933" y="2703044"/>
+                    </a:cubicBezTo>
+                    <a:lnTo>
+                      <a:pt x="544286" y="2784076"/>
+                    </a:lnTo>
+                    <a:lnTo>
+                      <a:pt x="470639" y="2703044"/>
+                    </a:lnTo>
+                    <a:cubicBezTo>
+                      <a:pt x="176621" y="2346777"/>
+                      <a:pt x="0" y="1890034"/>
+                      <a:pt x="0" y="1392038"/>
+                    </a:cubicBezTo>
+                    <a:cubicBezTo>
+                      <a:pt x="0" y="894043"/>
+                      <a:pt x="176621" y="437300"/>
+                      <a:pt x="470639" y="81032"/>
+                    </a:cubicBezTo>
+                    <a:close/>
+                  </a:path>
+                </a:pathLst>
+              </a:custGeom>
+              <a:gradFill flip="none" rotWithShape="1">
+                <a:gsLst>
+                  <a:gs pos="0">
+                    <a:srgbClr val="85DFFF"/>
+                  </a:gs>
+                  <a:gs pos="100000">
+                    <a:schemeClr val="bg1"/>
+                  </a:gs>
+                </a:gsLst>
+                <a:path path="circle">
+                  <a:fillToRect l="100000" t="100000"/>
+                </a:path>
+                <a:tileRect r="-100000" b="-100000"/>
+              </a:gradFill>
+              <a:ln>
+                <a:noFill/>
+              </a:ln>
+            </p:spPr>
+            <p:style>
+              <a:lnRef idx="2">
+                <a:schemeClr val="accent1">
+                  <a:shade val="15000"/>
+                </a:schemeClr>
+              </a:lnRef>
+              <a:fillRef idx="1">
+                <a:schemeClr val="accent1"/>
+              </a:fillRef>
+              <a:effectRef idx="0">
+                <a:schemeClr val="accent1"/>
+              </a:effectRef>
+              <a:fontRef idx="minor">
+                <a:schemeClr val="lt1"/>
+              </a:fontRef>
+            </p:style>
+            <p:txBody>
+              <a:bodyPr wrap="square" rtlCol="0" anchor="ctr">
+                <a:noAutofit/>
+              </a:bodyPr>
+              <a:lstStyle/>
+              <a:p>
+                <a:pPr algn="ctr"/>
+                <a:endParaRPr lang="zh-CN" altLang="en-US"/>
+              </a:p>
+            </p:txBody>
+          </p:sp>
+          <p:sp>
+            <p:nvSpPr>
+              <p:cNvPr id="24" name="任意多边形: 形状 23">
+                <a:extLst>
+                  <a:ext uri="{FF2B5EF4-FFF2-40B4-BE49-F238E27FC236}">
+                    <a16:creationId xmlns:a16="http://schemas.microsoft.com/office/drawing/2014/main" id="{EF955586-9F40-B728-0BC3-72DD5751EC34}"/>
+                  </a:ext>
+                </a:extLst>
+              </p:cNvPr>
+              <p:cNvSpPr/>
+              <p:nvPr/>
+            </p:nvSpPr>
+            <p:spPr>
+              <a:xfrm rot="21426923">
+                <a:off x="5551713" y="3880502"/>
+                <a:ext cx="1088572" cy="2784076"/>
+              </a:xfrm>
+              <a:custGeom>
+                <a:avLst/>
+                <a:gdLst>
+                  <a:gd name="connsiteX0" fmla="*/ 544286 w 1088572"/>
+                  <a:gd name="connsiteY0" fmla="*/ 0 h 2784076"/>
+                  <a:gd name="connsiteX1" fmla="*/ 617933 w 1088572"/>
+                  <a:gd name="connsiteY1" fmla="*/ 81032 h 2784076"/>
+                  <a:gd name="connsiteX2" fmla="*/ 1088572 w 1088572"/>
+                  <a:gd name="connsiteY2" fmla="*/ 1392038 h 2784076"/>
+                  <a:gd name="connsiteX3" fmla="*/ 617933 w 1088572"/>
+                  <a:gd name="connsiteY3" fmla="*/ 2703044 h 2784076"/>
+                  <a:gd name="connsiteX4" fmla="*/ 544286 w 1088572"/>
+                  <a:gd name="connsiteY4" fmla="*/ 2784076 h 2784076"/>
+                  <a:gd name="connsiteX5" fmla="*/ 470639 w 1088572"/>
+                  <a:gd name="connsiteY5" fmla="*/ 2703044 h 2784076"/>
+                  <a:gd name="connsiteX6" fmla="*/ 0 w 1088572"/>
+                  <a:gd name="connsiteY6" fmla="*/ 1392038 h 2784076"/>
+                  <a:gd name="connsiteX7" fmla="*/ 470639 w 1088572"/>
+                  <a:gd name="connsiteY7" fmla="*/ 81032 h 2784076"/>
+                </a:gdLst>
+                <a:ahLst/>
+                <a:cxnLst>
+                  <a:cxn ang="0">
+                    <a:pos x="connsiteX0" y="connsiteY0"/>
+                  </a:cxn>
+                  <a:cxn ang="0">
+                    <a:pos x="connsiteX1" y="connsiteY1"/>
+                  </a:cxn>
+                  <a:cxn ang="0">
+                    <a:pos x="connsiteX2" y="connsiteY2"/>
+                  </a:cxn>
+                  <a:cxn ang="0">
+                    <a:pos x="connsiteX3" y="connsiteY3"/>
+                  </a:cxn>
+                  <a:cxn ang="0">
+                    <a:pos x="connsiteX4" y="connsiteY4"/>
+                  </a:cxn>
+                  <a:cxn ang="0">
+                    <a:pos x="connsiteX5" y="connsiteY5"/>
+                  </a:cxn>
+                  <a:cxn ang="0">
+                    <a:pos x="connsiteX6" y="connsiteY6"/>
+                  </a:cxn>
+                  <a:cxn ang="0">
+                    <a:pos x="connsiteX7" y="connsiteY7"/>
+                  </a:cxn>
+                </a:cxnLst>
+                <a:rect l="l" t="t" r="r" b="b"/>
+                <a:pathLst>
+                  <a:path w="1088572" h="2784076">
+                    <a:moveTo>
+                      <a:pt x="544286" y="0"/>
+                    </a:moveTo>
+                    <a:lnTo>
+                      <a:pt x="617933" y="81032"/>
+                    </a:lnTo>
+                    <a:cubicBezTo>
+                      <a:pt x="911951" y="437300"/>
+                      <a:pt x="1088572" y="894043"/>
+                      <a:pt x="1088572" y="1392038"/>
+                    </a:cubicBezTo>
+                    <a:cubicBezTo>
+                      <a:pt x="1088572" y="1890034"/>
+                      <a:pt x="911951" y="2346777"/>
+                      <a:pt x="617933" y="2703044"/>
+                    </a:cubicBezTo>
+                    <a:lnTo>
+                      <a:pt x="544286" y="2784076"/>
+                    </a:lnTo>
+                    <a:lnTo>
+                      <a:pt x="470639" y="2703044"/>
+                    </a:lnTo>
+                    <a:cubicBezTo>
+                      <a:pt x="176621" y="2346777"/>
+                      <a:pt x="0" y="1890034"/>
+                      <a:pt x="0" y="1392038"/>
+                    </a:cubicBezTo>
+                    <a:cubicBezTo>
+                      <a:pt x="0" y="894043"/>
+                      <a:pt x="176621" y="437300"/>
+                      <a:pt x="470639" y="81032"/>
+                    </a:cubicBezTo>
+                    <a:close/>
+                  </a:path>
+                </a:pathLst>
+              </a:custGeom>
+              <a:gradFill flip="none" rotWithShape="1">
+                <a:gsLst>
+                  <a:gs pos="0">
+                    <a:srgbClr val="85DFFF"/>
+                  </a:gs>
+                  <a:gs pos="100000">
+                    <a:schemeClr val="bg1"/>
+                  </a:gs>
+                </a:gsLst>
+                <a:path path="circle">
+                  <a:fillToRect l="100000" t="100000"/>
+                </a:path>
+                <a:tileRect r="-100000" b="-100000"/>
+              </a:gradFill>
+              <a:ln>
+                <a:noFill/>
+              </a:ln>
+            </p:spPr>
+            <p:style>
+              <a:lnRef idx="2">
+                <a:schemeClr val="accent1">
+                  <a:shade val="15000"/>
+                </a:schemeClr>
+              </a:lnRef>
+              <a:fillRef idx="1">
+                <a:schemeClr val="accent1"/>
+              </a:fillRef>
+              <a:effectRef idx="0">
+                <a:schemeClr val="accent1"/>
+              </a:effectRef>
+              <a:fontRef idx="minor">
+                <a:schemeClr val="lt1"/>
+              </a:fontRef>
+            </p:style>
+            <p:txBody>
+              <a:bodyPr wrap="square" rtlCol="0" anchor="ctr">
+                <a:noAutofit/>
+              </a:bodyPr>
+              <a:lstStyle/>
+              <a:p>
+                <a:pPr algn="ctr"/>
+                <a:endParaRPr lang="zh-CN" altLang="en-US"/>
+              </a:p>
+            </p:txBody>
+          </p:sp>
+        </p:grpSp>
+      </p:grpSp>
+      <p:sp>
+        <p:nvSpPr>
+          <p:cNvPr id="2" name="任意多边形: 形状 1">
+            <a:extLst>
+              <a:ext uri="{FF2B5EF4-FFF2-40B4-BE49-F238E27FC236}">
+                <a16:creationId xmlns:a16="http://schemas.microsoft.com/office/drawing/2014/main" id="{EE85EB0D-C3DA-421E-BB92-FA03387CECDF}"/>
+              </a:ext>
+            </a:extLst>
+          </p:cNvPr>
+          <p:cNvSpPr/>
+          <p:nvPr/>
+        </p:nvSpPr>
+        <p:spPr>
+          <a:xfrm>
+            <a:off x="5929157" y="3243360"/>
+            <a:ext cx="343361" cy="368901"/>
+          </a:xfrm>
+          <a:custGeom>
+            <a:avLst/>
+            <a:gdLst>
+              <a:gd name="connsiteX0" fmla="*/ 426720 w 1053737"/>
+              <a:gd name="connsiteY0" fmla="*/ 505098 h 1132115"/>
+              <a:gd name="connsiteX1" fmla="*/ 522512 w 1053737"/>
+              <a:gd name="connsiteY1" fmla="*/ 505098 h 1132115"/>
+              <a:gd name="connsiteX2" fmla="*/ 627017 w 1053737"/>
+              <a:gd name="connsiteY2" fmla="*/ 609603 h 1132115"/>
+              <a:gd name="connsiteX3" fmla="*/ 627017 w 1053737"/>
+              <a:gd name="connsiteY3" fmla="*/ 627017 h 1132115"/>
+              <a:gd name="connsiteX4" fmla="*/ 426720 w 1053737"/>
+              <a:gd name="connsiteY4" fmla="*/ 627017 h 1132115"/>
+              <a:gd name="connsiteX5" fmla="*/ 104505 w 1053737"/>
+              <a:gd name="connsiteY5" fmla="*/ 505098 h 1132115"/>
+              <a:gd name="connsiteX6" fmla="*/ 113212 w 1053737"/>
+              <a:gd name="connsiteY6" fmla="*/ 505098 h 1132115"/>
+              <a:gd name="connsiteX7" fmla="*/ 113212 w 1053737"/>
+              <a:gd name="connsiteY7" fmla="*/ 522512 h 1132115"/>
+              <a:gd name="connsiteX8" fmla="*/ 217717 w 1053737"/>
+              <a:gd name="connsiteY8" fmla="*/ 627017 h 1132115"/>
+              <a:gd name="connsiteX9" fmla="*/ 426720 w 1053737"/>
+              <a:gd name="connsiteY9" fmla="*/ 627017 h 1132115"/>
+              <a:gd name="connsiteX10" fmla="*/ 426720 w 1053737"/>
+              <a:gd name="connsiteY10" fmla="*/ 775061 h 1132115"/>
+              <a:gd name="connsiteX11" fmla="*/ 531225 w 1053737"/>
+              <a:gd name="connsiteY11" fmla="*/ 879566 h 1132115"/>
+              <a:gd name="connsiteX12" fmla="*/ 627017 w 1053737"/>
+              <a:gd name="connsiteY12" fmla="*/ 879566 h 1132115"/>
+              <a:gd name="connsiteX13" fmla="*/ 627017 w 1053737"/>
+              <a:gd name="connsiteY13" fmla="*/ 1027610 h 1132115"/>
+              <a:gd name="connsiteX14" fmla="*/ 522512 w 1053737"/>
+              <a:gd name="connsiteY14" fmla="*/ 1132115 h 1132115"/>
+              <a:gd name="connsiteX15" fmla="*/ 104505 w 1053737"/>
+              <a:gd name="connsiteY15" fmla="*/ 1132115 h 1132115"/>
+              <a:gd name="connsiteX16" fmla="*/ 0 w 1053737"/>
+              <a:gd name="connsiteY16" fmla="*/ 1027610 h 1132115"/>
+              <a:gd name="connsiteX17" fmla="*/ 0 w 1053737"/>
+              <a:gd name="connsiteY17" fmla="*/ 609603 h 1132115"/>
+              <a:gd name="connsiteX18" fmla="*/ 104505 w 1053737"/>
+              <a:gd name="connsiteY18" fmla="*/ 505098 h 1132115"/>
+              <a:gd name="connsiteX19" fmla="*/ 740229 w 1053737"/>
+              <a:gd name="connsiteY19" fmla="*/ 252549 h 1132115"/>
+              <a:gd name="connsiteX20" fmla="*/ 949232 w 1053737"/>
+              <a:gd name="connsiteY20" fmla="*/ 252549 h 1132115"/>
+              <a:gd name="connsiteX21" fmla="*/ 1053737 w 1053737"/>
+              <a:gd name="connsiteY21" fmla="*/ 357054 h 1132115"/>
+              <a:gd name="connsiteX22" fmla="*/ 1053737 w 1053737"/>
+              <a:gd name="connsiteY22" fmla="*/ 775061 h 1132115"/>
+              <a:gd name="connsiteX23" fmla="*/ 949232 w 1053737"/>
+              <a:gd name="connsiteY23" fmla="*/ 879566 h 1132115"/>
+              <a:gd name="connsiteX24" fmla="*/ 627017 w 1053737"/>
+              <a:gd name="connsiteY24" fmla="*/ 879566 h 1132115"/>
+              <a:gd name="connsiteX25" fmla="*/ 627017 w 1053737"/>
+              <a:gd name="connsiteY25" fmla="*/ 627017 h 1132115"/>
+              <a:gd name="connsiteX26" fmla="*/ 635724 w 1053737"/>
+              <a:gd name="connsiteY26" fmla="*/ 627017 h 1132115"/>
+              <a:gd name="connsiteX27" fmla="*/ 740229 w 1053737"/>
+              <a:gd name="connsiteY27" fmla="*/ 522512 h 1132115"/>
+              <a:gd name="connsiteX28" fmla="*/ 217717 w 1053737"/>
+              <a:gd name="connsiteY28" fmla="*/ 0 h 1132115"/>
+              <a:gd name="connsiteX29" fmla="*/ 635724 w 1053737"/>
+              <a:gd name="connsiteY29" fmla="*/ 0 h 1132115"/>
+              <a:gd name="connsiteX30" fmla="*/ 740229 w 1053737"/>
+              <a:gd name="connsiteY30" fmla="*/ 104505 h 1132115"/>
+              <a:gd name="connsiteX31" fmla="*/ 740229 w 1053737"/>
+              <a:gd name="connsiteY31" fmla="*/ 252549 h 1132115"/>
+              <a:gd name="connsiteX32" fmla="*/ 531225 w 1053737"/>
+              <a:gd name="connsiteY32" fmla="*/ 252549 h 1132115"/>
+              <a:gd name="connsiteX33" fmla="*/ 426720 w 1053737"/>
+              <a:gd name="connsiteY33" fmla="*/ 357054 h 1132115"/>
+              <a:gd name="connsiteX34" fmla="*/ 426720 w 1053737"/>
+              <a:gd name="connsiteY34" fmla="*/ 505098 h 1132115"/>
+              <a:gd name="connsiteX35" fmla="*/ 113212 w 1053737"/>
+              <a:gd name="connsiteY35" fmla="*/ 505098 h 1132115"/>
+              <a:gd name="connsiteX36" fmla="*/ 113212 w 1053737"/>
+              <a:gd name="connsiteY36" fmla="*/ 104505 h 1132115"/>
+              <a:gd name="connsiteX37" fmla="*/ 217717 w 1053737"/>
+              <a:gd name="connsiteY37" fmla="*/ 0 h 1132115"/>
+            </a:gdLst>
+            <a:ahLst/>
+            <a:cxnLst>
+              <a:cxn ang="0">
+                <a:pos x="connsiteX0" y="connsiteY0"/>
+              </a:cxn>
+              <a:cxn ang="0">
+                <a:pos x="connsiteX1" y="connsiteY1"/>
+              </a:cxn>
+              <a:cxn ang="0">
+                <a:pos x="connsiteX2" y="connsiteY2"/>
+              </a:cxn>
+              <a:cxn ang="0">
+                <a:pos x="connsiteX3" y="connsiteY3"/>
+              </a:cxn>
+              <a:cxn ang="0">
+                <a:pos x="connsiteX4" y="connsiteY4"/>
+              </a:cxn>
+              <a:cxn ang="0">
+                <a:pos x="connsiteX5" y="connsiteY5"/>
+              </a:cxn>
+              <a:cxn ang="0">
+                <a:pos x="connsiteX6" y="connsiteY6"/>
+              </a:cxn>
+              <a:cxn ang="0">
+                <a:pos x="connsiteX7" y="connsiteY7"/>
+              </a:cxn>
+              <a:cxn ang="0">
+                <a:pos x="connsiteX8" y="connsiteY8"/>
+              </a:cxn>
+              <a:cxn ang="0">
+                <a:pos x="connsiteX9" y="connsiteY9"/>
+              </a:cxn>
+              <a:cxn ang="0">
+                <a:pos x="connsiteX10" y="connsiteY10"/>
+              </a:cxn>
+              <a:cxn ang="0">
+                <a:pos x="connsiteX11" y="connsiteY11"/>
+              </a:cxn>
+              <a:cxn ang="0">
+                <a:pos x="connsiteX12" y="connsiteY12"/>
+              </a:cxn>
+              <a:cxn ang="0">
+                <a:pos x="connsiteX13" y="connsiteY13"/>
+              </a:cxn>
+              <a:cxn ang="0">
+                <a:pos x="connsiteX14" y="connsiteY14"/>
+              </a:cxn>
+              <a:cxn ang="0">
+                <a:pos x="connsiteX15" y="connsiteY15"/>
+              </a:cxn>
+              <a:cxn ang="0">
+                <a:pos x="connsiteX16" y="connsiteY16"/>
+              </a:cxn>
+              <a:cxn ang="0">
+                <a:pos x="connsiteX17" y="connsiteY17"/>
+              </a:cxn>
+              <a:cxn ang="0">
+                <a:pos x="connsiteX18" y="connsiteY18"/>
+              </a:cxn>
+              <a:cxn ang="0">
+                <a:pos x="connsiteX19" y="connsiteY19"/>
+              </a:cxn>
+              <a:cxn ang="0">
+                <a:pos x="connsiteX20" y="connsiteY20"/>
+              </a:cxn>
+              <a:cxn ang="0">
+                <a:pos x="connsiteX21" y="connsiteY21"/>
+              </a:cxn>
+              <a:cxn ang="0">
+                <a:pos x="connsiteX22" y="connsiteY22"/>
+              </a:cxn>
+              <a:cxn ang="0">
+                <a:pos x="connsiteX23" y="connsiteY23"/>
+              </a:cxn>
+              <a:cxn ang="0">
+                <a:pos x="connsiteX24" y="connsiteY24"/>
+              </a:cxn>
+              <a:cxn ang="0">
+                <a:pos x="connsiteX25" y="connsiteY25"/>
+              </a:cxn>
+              <a:cxn ang="0">
+                <a:pos x="connsiteX26" y="connsiteY26"/>
+              </a:cxn>
+              <a:cxn ang="0">
+                <a:pos x="connsiteX27" y="connsiteY27"/>
+              </a:cxn>
+              <a:cxn ang="0">
+                <a:pos x="connsiteX28" y="connsiteY28"/>
+              </a:cxn>
+              <a:cxn ang="0">
+                <a:pos x="connsiteX29" y="connsiteY29"/>
+              </a:cxn>
+              <a:cxn ang="0">
+                <a:pos x="connsiteX30" y="connsiteY30"/>
+              </a:cxn>
+              <a:cxn ang="0">
+                <a:pos x="connsiteX31" y="connsiteY31"/>
+              </a:cxn>
+              <a:cxn ang="0">
+                <a:pos x="connsiteX32" y="connsiteY32"/>
+              </a:cxn>
+              <a:cxn ang="0">
+                <a:pos x="connsiteX33" y="connsiteY33"/>
+              </a:cxn>
+              <a:cxn ang="0">
+                <a:pos x="connsiteX34" y="connsiteY34"/>
+              </a:cxn>
+              <a:cxn ang="0">
+                <a:pos x="connsiteX35" y="connsiteY35"/>
+              </a:cxn>
+              <a:cxn ang="0">
+                <a:pos x="connsiteX36" y="connsiteY36"/>
+              </a:cxn>
+              <a:cxn ang="0">
+                <a:pos x="connsiteX37" y="connsiteY37"/>
+              </a:cxn>
+            </a:cxnLst>
+            <a:rect l="l" t="t" r="r" b="b"/>
+            <a:pathLst>
+              <a:path w="1053737" h="1132115">
+                <a:moveTo>
+                  <a:pt x="426720" y="505098"/>
+                </a:moveTo>
+                <a:lnTo>
+                  <a:pt x="522512" y="505098"/>
+                </a:lnTo>
+                <a:cubicBezTo>
+                  <a:pt x="580229" y="505098"/>
+                  <a:pt x="627017" y="551886"/>
+                  <a:pt x="627017" y="609603"/>
+                </a:cubicBezTo>
+                <a:lnTo>
+                  <a:pt x="627017" y="627017"/>
+                </a:lnTo>
+                <a:lnTo>
+                  <a:pt x="426720" y="627017"/>
+                </a:lnTo>
+                <a:close/>
+                <a:moveTo>
+                  <a:pt x="104505" y="505098"/>
+                </a:moveTo>
+                <a:lnTo>
+                  <a:pt x="113212" y="505098"/>
+                </a:lnTo>
+                <a:lnTo>
+                  <a:pt x="113212" y="522512"/>
+                </a:lnTo>
+                <a:cubicBezTo>
+                  <a:pt x="113212" y="580229"/>
+                  <a:pt x="160000" y="627017"/>
+                  <a:pt x="217717" y="627017"/>
+                </a:cubicBezTo>
+                <a:lnTo>
+                  <a:pt x="426720" y="627017"/>
+                </a:lnTo>
+                <a:lnTo>
+                  <a:pt x="426720" y="775061"/>
+                </a:lnTo>
+                <a:cubicBezTo>
+                  <a:pt x="426720" y="832778"/>
+                  <a:pt x="473508" y="879566"/>
+                  <a:pt x="531225" y="879566"/>
+                </a:cubicBezTo>
+                <a:lnTo>
+                  <a:pt x="627017" y="879566"/>
+                </a:lnTo>
+                <a:lnTo>
+                  <a:pt x="627017" y="1027610"/>
+                </a:lnTo>
+                <a:cubicBezTo>
+                  <a:pt x="627017" y="1085327"/>
+                  <a:pt x="580229" y="1132115"/>
+                  <a:pt x="522512" y="1132115"/>
+                </a:cubicBezTo>
+                <a:lnTo>
+                  <a:pt x="104505" y="1132115"/>
+                </a:lnTo>
+                <a:cubicBezTo>
+                  <a:pt x="46788" y="1132115"/>
+                  <a:pt x="0" y="1085327"/>
+                  <a:pt x="0" y="1027610"/>
+                </a:cubicBezTo>
+                <a:lnTo>
+                  <a:pt x="0" y="609603"/>
+                </a:lnTo>
+                <a:cubicBezTo>
+                  <a:pt x="0" y="551886"/>
+                  <a:pt x="46788" y="505098"/>
+                  <a:pt x="104505" y="505098"/>
+                </a:cubicBezTo>
+                <a:close/>
+                <a:moveTo>
+                  <a:pt x="740229" y="252549"/>
+                </a:moveTo>
+                <a:lnTo>
+                  <a:pt x="949232" y="252549"/>
+                </a:lnTo>
+                <a:cubicBezTo>
+                  <a:pt x="1006949" y="252549"/>
+                  <a:pt x="1053737" y="299337"/>
+                  <a:pt x="1053737" y="357054"/>
+                </a:cubicBezTo>
+                <a:lnTo>
+                  <a:pt x="1053737" y="775061"/>
+                </a:lnTo>
+                <a:cubicBezTo>
+                  <a:pt x="1053737" y="832778"/>
+                  <a:pt x="1006949" y="879566"/>
+                  <a:pt x="949232" y="879566"/>
+                </a:cubicBezTo>
+                <a:lnTo>
+                  <a:pt x="627017" y="879566"/>
+                </a:lnTo>
+                <a:lnTo>
+                  <a:pt x="627017" y="627017"/>
+                </a:lnTo>
+                <a:lnTo>
+                  <a:pt x="635724" y="627017"/>
+                </a:lnTo>
+                <a:cubicBezTo>
+                  <a:pt x="693441" y="627017"/>
+                  <a:pt x="740229" y="580229"/>
+                  <a:pt x="740229" y="522512"/>
+                </a:cubicBezTo>
+                <a:close/>
+                <a:moveTo>
+                  <a:pt x="217717" y="0"/>
+                </a:moveTo>
+                <a:lnTo>
+                  <a:pt x="635724" y="0"/>
+                </a:lnTo>
+                <a:cubicBezTo>
+                  <a:pt x="693441" y="0"/>
+                  <a:pt x="740229" y="46788"/>
+                  <a:pt x="740229" y="104505"/>
+                </a:cubicBezTo>
+                <a:lnTo>
+                  <a:pt x="740229" y="252549"/>
+                </a:lnTo>
+                <a:lnTo>
+                  <a:pt x="531225" y="252549"/>
+                </a:lnTo>
+                <a:cubicBezTo>
+                  <a:pt x="473508" y="252549"/>
+                  <a:pt x="426720" y="299337"/>
+                  <a:pt x="426720" y="357054"/>
+                </a:cubicBezTo>
+                <a:lnTo>
+                  <a:pt x="426720" y="505098"/>
+                </a:lnTo>
+                <a:lnTo>
+                  <a:pt x="113212" y="505098"/>
+                </a:lnTo>
+                <a:lnTo>
+                  <a:pt x="113212" y="104505"/>
+                </a:lnTo>
+                <a:cubicBezTo>
+                  <a:pt x="113212" y="46788"/>
+                  <a:pt x="160000" y="0"/>
+                  <a:pt x="217717" y="0"/>
+                </a:cubicBezTo>
+                <a:close/>
+              </a:path>
+            </a:pathLst>
+          </a:custGeom>
+          <a:solidFill>
+            <a:schemeClr val="bg1"/>
+          </a:solidFill>
+          <a:ln>
+            <a:noFill/>
+          </a:ln>
+        </p:spPr>
+        <p:style>
+          <a:lnRef idx="2">
+            <a:schemeClr val="accent1">
+              <a:shade val="15000"/>
+            </a:schemeClr>
+          </a:lnRef>
+          <a:fillRef idx="1">
+            <a:schemeClr val="accent1"/>
+          </a:fillRef>
+          <a:effectRef idx="0">
+            <a:schemeClr val="accent1"/>
+          </a:effectRef>
+          <a:fontRef idx="minor">
+            <a:schemeClr val="lt1"/>
+          </a:fontRef>
+        </p:style>
+        <p:txBody>
+          <a:bodyPr wrap="square" rtlCol="0" anchor="ctr">
+            <a:noAutofit/>
+          </a:bodyPr>
+          <a:lstStyle/>
+          <a:p>
+            <a:pPr algn="ctr"/>
+            <a:endParaRPr lang="zh-CN" altLang="en-US" dirty="0"/>
+          </a:p>
+        </p:txBody>
+      </p:sp>
+    </p:spTree>
+    <p:extLst>
+      <p:ext uri="{BB962C8B-B14F-4D97-AF65-F5344CB8AC3E}">
+        <p14:creationId xmlns:p14="http://schemas.microsoft.com/office/powerpoint/2010/main" val="1626279483"/>
+      </p:ext>
+    </p:extLst>
+  </p:cSld>
+  <p:clrMapOvr>
+    <a:masterClrMapping/>
+  </p:clrMapOvr>
+</p:sld>
+</file>
+
+<file path=ppt/slides/slide6.xml><?xml version="1.0" encoding="utf-8"?>
+<p:sld xmlns:a="http://schemas.openxmlformats.org/drawingml/2006/main" xmlns:r="http://schemas.openxmlformats.org/officeDocument/2006/relationships" xmlns:p="http://schemas.openxmlformats.org/presentationml/2006/main">
+  <p:cSld>
+    <p:spTree>
+      <p:nvGrpSpPr>
+        <p:cNvPr id="1" name=""/>
+        <p:cNvGrpSpPr/>
+        <p:nvPr/>
+      </p:nvGrpSpPr>
+      <p:grpSpPr>
+        <a:xfrm>
+          <a:off x="0" y="0"/>
+          <a:ext cx="0" cy="0"/>
+          <a:chOff x="0" y="0"/>
+          <a:chExt cx="0" cy="0"/>
+        </a:xfrm>
+      </p:grpSpPr>
+      <p:sp>
+        <p:nvSpPr>
+          <p:cNvPr id="12" name="矩形 11">
+            <a:extLst>
+              <a:ext uri="{FF2B5EF4-FFF2-40B4-BE49-F238E27FC236}">
+                <a16:creationId xmlns:a16="http://schemas.microsoft.com/office/drawing/2014/main" id="{B981EAB2-36BF-7156-890C-C5C0628C2073}"/>
+              </a:ext>
+            </a:extLst>
+          </p:cNvPr>
+          <p:cNvSpPr/>
+          <p:nvPr/>
+        </p:nvSpPr>
+        <p:spPr>
+          <a:xfrm>
+            <a:off x="0" y="0"/>
+            <a:ext cx="12192000" cy="6858000"/>
+          </a:xfrm>
+          <a:prstGeom prst="rect">
+            <a:avLst/>
+          </a:prstGeom>
+          <a:gradFill flip="none" rotWithShape="1">
+            <a:gsLst>
+              <a:gs pos="0">
+                <a:srgbClr val="002060"/>
+              </a:gs>
+              <a:gs pos="100000">
+                <a:schemeClr val="tx1">
+                  <a:lumMod val="95000"/>
+                  <a:lumOff val="5000"/>
+                </a:schemeClr>
+              </a:gs>
+            </a:gsLst>
+            <a:path path="circle">
+              <a:fillToRect l="50000" t="50000" r="50000" b="50000"/>
+            </a:path>
+            <a:tileRect/>
+          </a:gradFill>
+          <a:ln>
+            <a:noFill/>
+          </a:ln>
+        </p:spPr>
+        <p:style>
+          <a:lnRef idx="2">
+            <a:schemeClr val="accent1">
+              <a:shade val="15000"/>
+            </a:schemeClr>
+          </a:lnRef>
+          <a:fillRef idx="1">
+            <a:schemeClr val="accent1"/>
+          </a:fillRef>
+          <a:effectRef idx="0">
+            <a:schemeClr val="accent1"/>
+          </a:effectRef>
+          <a:fontRef idx="minor">
+            <a:schemeClr val="lt1"/>
+          </a:fontRef>
+        </p:style>
+        <p:txBody>
+          <a:bodyPr rtlCol="0" anchor="ctr"/>
+          <a:lstStyle/>
+          <a:p>
+            <a:pPr algn="ctr"/>
+            <a:endParaRPr lang="zh-CN" altLang="en-US"/>
+          </a:p>
+        </p:txBody>
+      </p:sp>
+      <p:grpSp>
+        <p:nvGrpSpPr>
+          <p:cNvPr id="25" name="组合 24">
+            <a:extLst>
+              <a:ext uri="{FF2B5EF4-FFF2-40B4-BE49-F238E27FC236}">
+                <a16:creationId xmlns:a16="http://schemas.microsoft.com/office/drawing/2014/main" id="{8F55D4E2-AB49-4A84-7F36-DE6BDFA4A5D3}"/>
+              </a:ext>
+            </a:extLst>
+          </p:cNvPr>
+          <p:cNvGrpSpPr/>
+          <p:nvPr/>
+        </p:nvGrpSpPr>
+        <p:grpSpPr>
+          <a:xfrm>
+            <a:off x="3263928" y="1917289"/>
+            <a:ext cx="5664144" cy="3021042"/>
+            <a:chOff x="3211272" y="3880502"/>
+            <a:chExt cx="5664144" cy="3021042"/>
+          </a:xfrm>
+          <a:effectLst/>
+        </p:grpSpPr>
+        <p:grpSp>
+          <p:nvGrpSpPr>
+            <p:cNvPr id="19" name="组合 18">
+              <a:extLst>
+                <a:ext uri="{FF2B5EF4-FFF2-40B4-BE49-F238E27FC236}">
+                  <a16:creationId xmlns:a16="http://schemas.microsoft.com/office/drawing/2014/main" id="{5A5CC7E4-C893-5732-0BA9-042A6ED8A6D8}"/>
+                </a:ext>
+              </a:extLst>
+            </p:cNvPr>
+            <p:cNvGrpSpPr/>
+            <p:nvPr/>
+          </p:nvGrpSpPr>
+          <p:grpSpPr>
+            <a:xfrm>
+              <a:off x="5551713" y="3880502"/>
+              <a:ext cx="3323703" cy="2994903"/>
+              <a:chOff x="5551713" y="3880502"/>
+              <a:chExt cx="3323703" cy="2994903"/>
+            </a:xfrm>
+          </p:grpSpPr>
+          <p:sp>
+            <p:nvSpPr>
+              <p:cNvPr id="18" name="任意多边形: 形状 17">
+                <a:extLst>
+                  <a:ext uri="{FF2B5EF4-FFF2-40B4-BE49-F238E27FC236}">
+                    <a16:creationId xmlns:a16="http://schemas.microsoft.com/office/drawing/2014/main" id="{94D532BC-CBFA-7277-D5F1-49C519F40840}"/>
+                  </a:ext>
+                </a:extLst>
+              </p:cNvPr>
+              <p:cNvSpPr/>
+              <p:nvPr/>
+            </p:nvSpPr>
+            <p:spPr>
+              <a:xfrm rot="4731122">
+                <a:off x="6939092" y="4939081"/>
+                <a:ext cx="1088572" cy="2784076"/>
+              </a:xfrm>
+              <a:custGeom>
+                <a:avLst/>
+                <a:gdLst>
+                  <a:gd name="connsiteX0" fmla="*/ 544286 w 1088572"/>
+                  <a:gd name="connsiteY0" fmla="*/ 0 h 2784076"/>
+                  <a:gd name="connsiteX1" fmla="*/ 617933 w 1088572"/>
+                  <a:gd name="connsiteY1" fmla="*/ 81032 h 2784076"/>
+                  <a:gd name="connsiteX2" fmla="*/ 1088572 w 1088572"/>
+                  <a:gd name="connsiteY2" fmla="*/ 1392038 h 2784076"/>
+                  <a:gd name="connsiteX3" fmla="*/ 617933 w 1088572"/>
+                  <a:gd name="connsiteY3" fmla="*/ 2703044 h 2784076"/>
+                  <a:gd name="connsiteX4" fmla="*/ 544286 w 1088572"/>
+                  <a:gd name="connsiteY4" fmla="*/ 2784076 h 2784076"/>
+                  <a:gd name="connsiteX5" fmla="*/ 470639 w 1088572"/>
+                  <a:gd name="connsiteY5" fmla="*/ 2703044 h 2784076"/>
+                  <a:gd name="connsiteX6" fmla="*/ 0 w 1088572"/>
+                  <a:gd name="connsiteY6" fmla="*/ 1392038 h 2784076"/>
+                  <a:gd name="connsiteX7" fmla="*/ 470639 w 1088572"/>
+                  <a:gd name="connsiteY7" fmla="*/ 81032 h 2784076"/>
+                </a:gdLst>
+                <a:ahLst/>
+                <a:cxnLst>
+                  <a:cxn ang="0">
+                    <a:pos x="connsiteX0" y="connsiteY0"/>
+                  </a:cxn>
+                  <a:cxn ang="0">
+                    <a:pos x="connsiteX1" y="connsiteY1"/>
+                  </a:cxn>
+                  <a:cxn ang="0">
+                    <a:pos x="connsiteX2" y="connsiteY2"/>
+                  </a:cxn>
+                  <a:cxn ang="0">
+                    <a:pos x="connsiteX3" y="connsiteY3"/>
+                  </a:cxn>
+                  <a:cxn ang="0">
+                    <a:pos x="connsiteX4" y="connsiteY4"/>
+                  </a:cxn>
+                  <a:cxn ang="0">
+                    <a:pos x="connsiteX5" y="connsiteY5"/>
+                  </a:cxn>
+                  <a:cxn ang="0">
+                    <a:pos x="connsiteX6" y="connsiteY6"/>
+                  </a:cxn>
+                  <a:cxn ang="0">
+                    <a:pos x="connsiteX7" y="connsiteY7"/>
+                  </a:cxn>
+                </a:cxnLst>
+                <a:rect l="l" t="t" r="r" b="b"/>
+                <a:pathLst>
+                  <a:path w="1088572" h="2784076">
+                    <a:moveTo>
+                      <a:pt x="544286" y="0"/>
+                    </a:moveTo>
+                    <a:lnTo>
+                      <a:pt x="617933" y="81032"/>
+                    </a:lnTo>
+                    <a:cubicBezTo>
+                      <a:pt x="911951" y="437300"/>
+                      <a:pt x="1088572" y="894043"/>
+                      <a:pt x="1088572" y="1392038"/>
+                    </a:cubicBezTo>
+                    <a:cubicBezTo>
+                      <a:pt x="1088572" y="1890034"/>
+                      <a:pt x="911951" y="2346777"/>
+                      <a:pt x="617933" y="2703044"/>
+                    </a:cubicBezTo>
+                    <a:lnTo>
+                      <a:pt x="544286" y="2784076"/>
+                    </a:lnTo>
+                    <a:lnTo>
+                      <a:pt x="470639" y="2703044"/>
+                    </a:lnTo>
+                    <a:cubicBezTo>
+                      <a:pt x="176621" y="2346777"/>
+                      <a:pt x="0" y="1890034"/>
+                      <a:pt x="0" y="1392038"/>
+                    </a:cubicBezTo>
+                    <a:cubicBezTo>
+                      <a:pt x="0" y="894043"/>
+                      <a:pt x="176621" y="437300"/>
+                      <a:pt x="470639" y="81032"/>
+                    </a:cubicBezTo>
+                    <a:close/>
+                  </a:path>
+                </a:pathLst>
+              </a:custGeom>
+              <a:gradFill flip="none" rotWithShape="1">
+                <a:gsLst>
+                  <a:gs pos="0">
+                    <a:srgbClr val="000818"/>
+                  </a:gs>
+                  <a:gs pos="100000">
+                    <a:srgbClr val="0036A2">
+                      <a:alpha val="50000"/>
+                    </a:srgbClr>
+                  </a:gs>
+                </a:gsLst>
+                <a:path path="circle">
+                  <a:fillToRect l="100000" t="100000"/>
+                </a:path>
+                <a:tileRect r="-100000" b="-100000"/>
+              </a:gradFill>
+              <a:ln>
+                <a:noFill/>
+              </a:ln>
+            </p:spPr>
+            <p:style>
+              <a:lnRef idx="2">
+                <a:schemeClr val="accent1">
+                  <a:shade val="15000"/>
+                </a:schemeClr>
+              </a:lnRef>
+              <a:fillRef idx="1">
+                <a:schemeClr val="accent1"/>
+              </a:fillRef>
+              <a:effectRef idx="0">
+                <a:schemeClr val="accent1"/>
+              </a:effectRef>
+              <a:fontRef idx="minor">
+                <a:schemeClr val="lt1"/>
+              </a:fontRef>
+            </p:style>
+            <p:txBody>
+              <a:bodyPr wrap="square" rtlCol="0" anchor="ctr">
+                <a:noAutofit/>
+              </a:bodyPr>
+              <a:lstStyle/>
+              <a:p>
+                <a:pPr algn="ctr"/>
+                <a:endParaRPr lang="zh-CN" altLang="en-US"/>
+              </a:p>
+            </p:txBody>
+          </p:sp>
+          <p:sp>
+            <p:nvSpPr>
+              <p:cNvPr id="15" name="任意多边形: 形状 14">
+                <a:extLst>
+                  <a:ext uri="{FF2B5EF4-FFF2-40B4-BE49-F238E27FC236}">
+                    <a16:creationId xmlns:a16="http://schemas.microsoft.com/office/drawing/2014/main" id="{D113332C-0CE6-EABA-C761-CF48E30A2BD6}"/>
+                  </a:ext>
+                </a:extLst>
+              </p:cNvPr>
+              <p:cNvSpPr/>
+              <p:nvPr/>
+            </p:nvSpPr>
+            <p:spPr>
+              <a:xfrm rot="2988853">
+                <a:off x="6626487" y="4399162"/>
+                <a:ext cx="1088572" cy="2784076"/>
+              </a:xfrm>
+              <a:custGeom>
+                <a:avLst/>
+                <a:gdLst>
+                  <a:gd name="connsiteX0" fmla="*/ 544286 w 1088572"/>
+                  <a:gd name="connsiteY0" fmla="*/ 0 h 2784076"/>
+                  <a:gd name="connsiteX1" fmla="*/ 617933 w 1088572"/>
+                  <a:gd name="connsiteY1" fmla="*/ 81032 h 2784076"/>
+                  <a:gd name="connsiteX2" fmla="*/ 1088572 w 1088572"/>
+                  <a:gd name="connsiteY2" fmla="*/ 1392038 h 2784076"/>
+                  <a:gd name="connsiteX3" fmla="*/ 617933 w 1088572"/>
+                  <a:gd name="connsiteY3" fmla="*/ 2703044 h 2784076"/>
+                  <a:gd name="connsiteX4" fmla="*/ 544286 w 1088572"/>
+                  <a:gd name="connsiteY4" fmla="*/ 2784076 h 2784076"/>
+                  <a:gd name="connsiteX5" fmla="*/ 470639 w 1088572"/>
+                  <a:gd name="connsiteY5" fmla="*/ 2703044 h 2784076"/>
+                  <a:gd name="connsiteX6" fmla="*/ 0 w 1088572"/>
+                  <a:gd name="connsiteY6" fmla="*/ 1392038 h 2784076"/>
+                  <a:gd name="connsiteX7" fmla="*/ 470639 w 1088572"/>
+                  <a:gd name="connsiteY7" fmla="*/ 81032 h 2784076"/>
+                </a:gdLst>
+                <a:ahLst/>
+                <a:cxnLst>
+                  <a:cxn ang="0">
+                    <a:pos x="connsiteX0" y="connsiteY0"/>
+                  </a:cxn>
+                  <a:cxn ang="0">
+                    <a:pos x="connsiteX1" y="connsiteY1"/>
+                  </a:cxn>
+                  <a:cxn ang="0">
+                    <a:pos x="connsiteX2" y="connsiteY2"/>
+                  </a:cxn>
+                  <a:cxn ang="0">
+                    <a:pos x="connsiteX3" y="connsiteY3"/>
+                  </a:cxn>
+                  <a:cxn ang="0">
+                    <a:pos x="connsiteX4" y="connsiteY4"/>
+                  </a:cxn>
+                  <a:cxn ang="0">
+                    <a:pos x="connsiteX5" y="connsiteY5"/>
+                  </a:cxn>
+                  <a:cxn ang="0">
+                    <a:pos x="connsiteX6" y="connsiteY6"/>
+                  </a:cxn>
+                  <a:cxn ang="0">
+                    <a:pos x="connsiteX7" y="connsiteY7"/>
+                  </a:cxn>
+                </a:cxnLst>
+                <a:rect l="l" t="t" r="r" b="b"/>
+                <a:pathLst>
+                  <a:path w="1088572" h="2784076">
+                    <a:moveTo>
+                      <a:pt x="544286" y="0"/>
+                    </a:moveTo>
+                    <a:lnTo>
+                      <a:pt x="617933" y="81032"/>
+                    </a:lnTo>
+                    <a:cubicBezTo>
+                      <a:pt x="911951" y="437300"/>
+                      <a:pt x="1088572" y="894043"/>
+                      <a:pt x="1088572" y="1392038"/>
+                    </a:cubicBezTo>
+                    <a:cubicBezTo>
+                      <a:pt x="1088572" y="1890034"/>
+                      <a:pt x="911951" y="2346777"/>
+                      <a:pt x="617933" y="2703044"/>
+                    </a:cubicBezTo>
+                    <a:lnTo>
+                      <a:pt x="544286" y="2784076"/>
+                    </a:lnTo>
+                    <a:lnTo>
+                      <a:pt x="470639" y="2703044"/>
+                    </a:lnTo>
+                    <a:cubicBezTo>
+                      <a:pt x="176621" y="2346777"/>
+                      <a:pt x="0" y="1890034"/>
+                      <a:pt x="0" y="1392038"/>
+                    </a:cubicBezTo>
+                    <a:cubicBezTo>
+                      <a:pt x="0" y="894043"/>
+                      <a:pt x="176621" y="437300"/>
+                      <a:pt x="470639" y="81032"/>
+                    </a:cubicBezTo>
+                    <a:close/>
+                  </a:path>
+                </a:pathLst>
+              </a:custGeom>
+              <a:gradFill flip="none" rotWithShape="1">
+                <a:gsLst>
+                  <a:gs pos="0">
+                    <a:srgbClr val="000818"/>
+                  </a:gs>
+                  <a:gs pos="100000">
+                    <a:srgbClr val="0036A2">
+                      <a:alpha val="50000"/>
+                    </a:srgbClr>
+                  </a:gs>
+                </a:gsLst>
+                <a:path path="circle">
+                  <a:fillToRect l="100000" t="100000"/>
+                </a:path>
+                <a:tileRect r="-100000" b="-100000"/>
+              </a:gradFill>
+              <a:ln>
+                <a:noFill/>
+              </a:ln>
+            </p:spPr>
+            <p:style>
+              <a:lnRef idx="2">
+                <a:schemeClr val="accent1">
+                  <a:shade val="15000"/>
+                </a:schemeClr>
+              </a:lnRef>
+              <a:fillRef idx="1">
+                <a:schemeClr val="accent1"/>
+              </a:fillRef>
+              <a:effectRef idx="0">
+                <a:schemeClr val="accent1"/>
+              </a:effectRef>
+              <a:fontRef idx="minor">
+                <a:schemeClr val="lt1"/>
+              </a:fontRef>
+            </p:style>
+            <p:txBody>
+              <a:bodyPr wrap="square" rtlCol="0" anchor="ctr">
+                <a:noAutofit/>
+              </a:bodyPr>
+              <a:lstStyle/>
+              <a:p>
+                <a:pPr algn="ctr"/>
+                <a:endParaRPr lang="zh-CN" altLang="en-US" dirty="0"/>
+              </a:p>
+            </p:txBody>
+          </p:sp>
+          <p:sp>
+            <p:nvSpPr>
+              <p:cNvPr id="16" name="任意多边形: 形状 15">
+                <a:extLst>
+                  <a:ext uri="{FF2B5EF4-FFF2-40B4-BE49-F238E27FC236}">
+                    <a16:creationId xmlns:a16="http://schemas.microsoft.com/office/drawing/2014/main" id="{080863DF-3A3A-0C13-65CF-88CDF3563234}"/>
+                  </a:ext>
+                </a:extLst>
+              </p:cNvPr>
+              <p:cNvSpPr/>
+              <p:nvPr/>
+            </p:nvSpPr>
+            <p:spPr>
+              <a:xfrm rot="1356476">
+                <a:off x="6226332" y="3971657"/>
+                <a:ext cx="1088572" cy="2784076"/>
+              </a:xfrm>
+              <a:custGeom>
+                <a:avLst/>
+                <a:gdLst>
+                  <a:gd name="connsiteX0" fmla="*/ 544286 w 1088572"/>
+                  <a:gd name="connsiteY0" fmla="*/ 0 h 2784076"/>
+                  <a:gd name="connsiteX1" fmla="*/ 617933 w 1088572"/>
+                  <a:gd name="connsiteY1" fmla="*/ 81032 h 2784076"/>
+                  <a:gd name="connsiteX2" fmla="*/ 1088572 w 1088572"/>
+                  <a:gd name="connsiteY2" fmla="*/ 1392038 h 2784076"/>
+                  <a:gd name="connsiteX3" fmla="*/ 617933 w 1088572"/>
+                  <a:gd name="connsiteY3" fmla="*/ 2703044 h 2784076"/>
+                  <a:gd name="connsiteX4" fmla="*/ 544286 w 1088572"/>
+                  <a:gd name="connsiteY4" fmla="*/ 2784076 h 2784076"/>
+                  <a:gd name="connsiteX5" fmla="*/ 470639 w 1088572"/>
+                  <a:gd name="connsiteY5" fmla="*/ 2703044 h 2784076"/>
+                  <a:gd name="connsiteX6" fmla="*/ 0 w 1088572"/>
+                  <a:gd name="connsiteY6" fmla="*/ 1392038 h 2784076"/>
+                  <a:gd name="connsiteX7" fmla="*/ 470639 w 1088572"/>
+                  <a:gd name="connsiteY7" fmla="*/ 81032 h 2784076"/>
+                </a:gdLst>
+                <a:ahLst/>
+                <a:cxnLst>
+                  <a:cxn ang="0">
+                    <a:pos x="connsiteX0" y="connsiteY0"/>
+                  </a:cxn>
+                  <a:cxn ang="0">
+                    <a:pos x="connsiteX1" y="connsiteY1"/>
+                  </a:cxn>
+                  <a:cxn ang="0">
+                    <a:pos x="connsiteX2" y="connsiteY2"/>
+                  </a:cxn>
+                  <a:cxn ang="0">
+                    <a:pos x="connsiteX3" y="connsiteY3"/>
+                  </a:cxn>
+                  <a:cxn ang="0">
+                    <a:pos x="connsiteX4" y="connsiteY4"/>
+                  </a:cxn>
+                  <a:cxn ang="0">
+                    <a:pos x="connsiteX5" y="connsiteY5"/>
+                  </a:cxn>
+                  <a:cxn ang="0">
+                    <a:pos x="connsiteX6" y="connsiteY6"/>
+                  </a:cxn>
+                  <a:cxn ang="0">
+                    <a:pos x="connsiteX7" y="connsiteY7"/>
+                  </a:cxn>
+                </a:cxnLst>
+                <a:rect l="l" t="t" r="r" b="b"/>
+                <a:pathLst>
+                  <a:path w="1088572" h="2784076">
+                    <a:moveTo>
+                      <a:pt x="544286" y="0"/>
+                    </a:moveTo>
+                    <a:lnTo>
+                      <a:pt x="617933" y="81032"/>
+                    </a:lnTo>
+                    <a:cubicBezTo>
+                      <a:pt x="911951" y="437300"/>
+                      <a:pt x="1088572" y="894043"/>
+                      <a:pt x="1088572" y="1392038"/>
+                    </a:cubicBezTo>
+                    <a:cubicBezTo>
+                      <a:pt x="1088572" y="1890034"/>
+                      <a:pt x="911951" y="2346777"/>
+                      <a:pt x="617933" y="2703044"/>
+                    </a:cubicBezTo>
+                    <a:lnTo>
+                      <a:pt x="544286" y="2784076"/>
+                    </a:lnTo>
+                    <a:lnTo>
+                      <a:pt x="470639" y="2703044"/>
+                    </a:lnTo>
+                    <a:cubicBezTo>
+                      <a:pt x="176621" y="2346777"/>
+                      <a:pt x="0" y="1890034"/>
+                      <a:pt x="0" y="1392038"/>
+                    </a:cubicBezTo>
+                    <a:cubicBezTo>
+                      <a:pt x="0" y="894043"/>
+                      <a:pt x="176621" y="437300"/>
+                      <a:pt x="470639" y="81032"/>
+                    </a:cubicBezTo>
+                    <a:close/>
+                  </a:path>
+                </a:pathLst>
+              </a:custGeom>
+              <a:gradFill flip="none" rotWithShape="1">
+                <a:gsLst>
+                  <a:gs pos="0">
+                    <a:srgbClr val="000818"/>
+                  </a:gs>
+                  <a:gs pos="100000">
+                    <a:srgbClr val="0036A2">
+                      <a:alpha val="50000"/>
+                    </a:srgbClr>
+                  </a:gs>
+                </a:gsLst>
+                <a:path path="circle">
+                  <a:fillToRect l="100000" t="100000"/>
+                </a:path>
+                <a:tileRect r="-100000" b="-100000"/>
+              </a:gradFill>
+              <a:ln>
+                <a:noFill/>
+              </a:ln>
+            </p:spPr>
+            <p:style>
+              <a:lnRef idx="2">
+                <a:schemeClr val="accent1">
+                  <a:shade val="15000"/>
+                </a:schemeClr>
+              </a:lnRef>
+              <a:fillRef idx="1">
+                <a:schemeClr val="accent1"/>
+              </a:fillRef>
+              <a:effectRef idx="0">
+                <a:schemeClr val="accent1"/>
+              </a:effectRef>
+              <a:fontRef idx="minor">
+                <a:schemeClr val="lt1"/>
+              </a:fontRef>
+            </p:style>
+            <p:txBody>
+              <a:bodyPr wrap="square" rtlCol="0" anchor="ctr">
+                <a:noAutofit/>
+              </a:bodyPr>
+              <a:lstStyle/>
+              <a:p>
+                <a:pPr algn="ctr"/>
+                <a:endParaRPr lang="zh-CN" altLang="en-US" dirty="0"/>
+              </a:p>
+            </p:txBody>
+          </p:sp>
+          <p:sp>
+            <p:nvSpPr>
+              <p:cNvPr id="17" name="任意多边形: 形状 16">
+                <a:extLst>
+                  <a:ext uri="{FF2B5EF4-FFF2-40B4-BE49-F238E27FC236}">
+                    <a16:creationId xmlns:a16="http://schemas.microsoft.com/office/drawing/2014/main" id="{3CB14DCD-2D95-7622-6A86-859B36A7E3AB}"/>
+                  </a:ext>
+                </a:extLst>
+              </p:cNvPr>
+              <p:cNvSpPr/>
+              <p:nvPr/>
+            </p:nvSpPr>
+            <p:spPr>
+              <a:xfrm rot="21426923">
+                <a:off x="5551713" y="3880502"/>
+                <a:ext cx="1088572" cy="2784076"/>
+              </a:xfrm>
+              <a:custGeom>
+                <a:avLst/>
+                <a:gdLst>
+                  <a:gd name="connsiteX0" fmla="*/ 544286 w 1088572"/>
+                  <a:gd name="connsiteY0" fmla="*/ 0 h 2784076"/>
+                  <a:gd name="connsiteX1" fmla="*/ 617933 w 1088572"/>
+                  <a:gd name="connsiteY1" fmla="*/ 81032 h 2784076"/>
+                  <a:gd name="connsiteX2" fmla="*/ 1088572 w 1088572"/>
+                  <a:gd name="connsiteY2" fmla="*/ 1392038 h 2784076"/>
+                  <a:gd name="connsiteX3" fmla="*/ 617933 w 1088572"/>
+                  <a:gd name="connsiteY3" fmla="*/ 2703044 h 2784076"/>
+                  <a:gd name="connsiteX4" fmla="*/ 544286 w 1088572"/>
+                  <a:gd name="connsiteY4" fmla="*/ 2784076 h 2784076"/>
+                  <a:gd name="connsiteX5" fmla="*/ 470639 w 1088572"/>
+                  <a:gd name="connsiteY5" fmla="*/ 2703044 h 2784076"/>
+                  <a:gd name="connsiteX6" fmla="*/ 0 w 1088572"/>
+                  <a:gd name="connsiteY6" fmla="*/ 1392038 h 2784076"/>
+                  <a:gd name="connsiteX7" fmla="*/ 470639 w 1088572"/>
+                  <a:gd name="connsiteY7" fmla="*/ 81032 h 2784076"/>
+                </a:gdLst>
+                <a:ahLst/>
+                <a:cxnLst>
+                  <a:cxn ang="0">
+                    <a:pos x="connsiteX0" y="connsiteY0"/>
+                  </a:cxn>
+                  <a:cxn ang="0">
+                    <a:pos x="connsiteX1" y="connsiteY1"/>
+                  </a:cxn>
+                  <a:cxn ang="0">
+                    <a:pos x="connsiteX2" y="connsiteY2"/>
+                  </a:cxn>
+                  <a:cxn ang="0">
+                    <a:pos x="connsiteX3" y="connsiteY3"/>
+                  </a:cxn>
+                  <a:cxn ang="0">
+                    <a:pos x="connsiteX4" y="connsiteY4"/>
+                  </a:cxn>
+                  <a:cxn ang="0">
+                    <a:pos x="connsiteX5" y="connsiteY5"/>
+                  </a:cxn>
+                  <a:cxn ang="0">
+                    <a:pos x="connsiteX6" y="connsiteY6"/>
+                  </a:cxn>
+                  <a:cxn ang="0">
+                    <a:pos x="connsiteX7" y="connsiteY7"/>
+                  </a:cxn>
+                </a:cxnLst>
+                <a:rect l="l" t="t" r="r" b="b"/>
+                <a:pathLst>
+                  <a:path w="1088572" h="2784076">
+                    <a:moveTo>
+                      <a:pt x="544286" y="0"/>
+                    </a:moveTo>
+                    <a:lnTo>
+                      <a:pt x="617933" y="81032"/>
+                    </a:lnTo>
+                    <a:cubicBezTo>
+                      <a:pt x="911951" y="437300"/>
+                      <a:pt x="1088572" y="894043"/>
+                      <a:pt x="1088572" y="1392038"/>
+                    </a:cubicBezTo>
+                    <a:cubicBezTo>
+                      <a:pt x="1088572" y="1890034"/>
+                      <a:pt x="911951" y="2346777"/>
+                      <a:pt x="617933" y="2703044"/>
+                    </a:cubicBezTo>
+                    <a:lnTo>
+                      <a:pt x="544286" y="2784076"/>
+                    </a:lnTo>
+                    <a:lnTo>
+                      <a:pt x="470639" y="2703044"/>
+                    </a:lnTo>
+                    <a:cubicBezTo>
+                      <a:pt x="176621" y="2346777"/>
+                      <a:pt x="0" y="1890034"/>
+                      <a:pt x="0" y="1392038"/>
+                    </a:cubicBezTo>
+                    <a:cubicBezTo>
+                      <a:pt x="0" y="894043"/>
+                      <a:pt x="176621" y="437300"/>
+                      <a:pt x="470639" y="81032"/>
+                    </a:cubicBezTo>
+                    <a:close/>
+                  </a:path>
+                </a:pathLst>
+              </a:custGeom>
+              <a:gradFill flip="none" rotWithShape="1">
+                <a:gsLst>
+                  <a:gs pos="0">
+                    <a:srgbClr val="000818"/>
+                  </a:gs>
+                  <a:gs pos="100000">
+                    <a:srgbClr val="0036A2">
+                      <a:alpha val="50000"/>
+                    </a:srgbClr>
+                  </a:gs>
+                </a:gsLst>
+                <a:path path="circle">
+                  <a:fillToRect l="100000" t="100000"/>
+                </a:path>
+                <a:tileRect r="-100000" b="-100000"/>
+              </a:gradFill>
+              <a:ln>
+                <a:noFill/>
+              </a:ln>
+            </p:spPr>
+            <p:style>
+              <a:lnRef idx="2">
+                <a:schemeClr val="accent1">
+                  <a:shade val="15000"/>
+                </a:schemeClr>
+              </a:lnRef>
+              <a:fillRef idx="1">
+                <a:schemeClr val="accent1"/>
+              </a:fillRef>
+              <a:effectRef idx="0">
+                <a:schemeClr val="accent1"/>
+              </a:effectRef>
+              <a:fontRef idx="minor">
+                <a:schemeClr val="lt1"/>
+              </a:fontRef>
+            </p:style>
+            <p:txBody>
+              <a:bodyPr wrap="square" rtlCol="0" anchor="ctr">
+                <a:noAutofit/>
+              </a:bodyPr>
+              <a:lstStyle/>
+              <a:p>
+                <a:pPr algn="ctr"/>
+                <a:endParaRPr lang="zh-CN" altLang="en-US"/>
+              </a:p>
+            </p:txBody>
+          </p:sp>
+        </p:grpSp>
+        <p:grpSp>
+          <p:nvGrpSpPr>
+            <p:cNvPr id="20" name="组合 19">
+              <a:extLst>
+                <a:ext uri="{FF2B5EF4-FFF2-40B4-BE49-F238E27FC236}">
+                  <a16:creationId xmlns:a16="http://schemas.microsoft.com/office/drawing/2014/main" id="{1B47DE55-D6A1-BC9C-CC92-5D4AFDCC8905}"/>
+                </a:ext>
+              </a:extLst>
+            </p:cNvPr>
+            <p:cNvGrpSpPr/>
+            <p:nvPr/>
+          </p:nvGrpSpPr>
+          <p:grpSpPr>
+            <a:xfrm flipH="1">
+              <a:off x="3211272" y="3906641"/>
+              <a:ext cx="3323703" cy="2994903"/>
+              <a:chOff x="5551713" y="3880502"/>
+              <a:chExt cx="3323703" cy="2994903"/>
+            </a:xfrm>
+          </p:grpSpPr>
+          <p:sp>
+            <p:nvSpPr>
+              <p:cNvPr id="21" name="任意多边形: 形状 20">
+                <a:extLst>
+                  <a:ext uri="{FF2B5EF4-FFF2-40B4-BE49-F238E27FC236}">
+                    <a16:creationId xmlns:a16="http://schemas.microsoft.com/office/drawing/2014/main" id="{BAE122EE-BE64-7379-D841-3677CFB04197}"/>
+                  </a:ext>
+                </a:extLst>
+              </p:cNvPr>
+              <p:cNvSpPr/>
+              <p:nvPr/>
+            </p:nvSpPr>
+            <p:spPr>
+              <a:xfrm rot="4731122">
+                <a:off x="6939092" y="4939081"/>
+                <a:ext cx="1088572" cy="2784076"/>
+              </a:xfrm>
+              <a:custGeom>
+                <a:avLst/>
+                <a:gdLst>
+                  <a:gd name="connsiteX0" fmla="*/ 544286 w 1088572"/>
+                  <a:gd name="connsiteY0" fmla="*/ 0 h 2784076"/>
+                  <a:gd name="connsiteX1" fmla="*/ 617933 w 1088572"/>
+                  <a:gd name="connsiteY1" fmla="*/ 81032 h 2784076"/>
+                  <a:gd name="connsiteX2" fmla="*/ 1088572 w 1088572"/>
+                  <a:gd name="connsiteY2" fmla="*/ 1392038 h 2784076"/>
+                  <a:gd name="connsiteX3" fmla="*/ 617933 w 1088572"/>
+                  <a:gd name="connsiteY3" fmla="*/ 2703044 h 2784076"/>
+                  <a:gd name="connsiteX4" fmla="*/ 544286 w 1088572"/>
+                  <a:gd name="connsiteY4" fmla="*/ 2784076 h 2784076"/>
+                  <a:gd name="connsiteX5" fmla="*/ 470639 w 1088572"/>
+                  <a:gd name="connsiteY5" fmla="*/ 2703044 h 2784076"/>
+                  <a:gd name="connsiteX6" fmla="*/ 0 w 1088572"/>
+                  <a:gd name="connsiteY6" fmla="*/ 1392038 h 2784076"/>
+                  <a:gd name="connsiteX7" fmla="*/ 470639 w 1088572"/>
+                  <a:gd name="connsiteY7" fmla="*/ 81032 h 2784076"/>
+                </a:gdLst>
+                <a:ahLst/>
+                <a:cxnLst>
+                  <a:cxn ang="0">
+                    <a:pos x="connsiteX0" y="connsiteY0"/>
+                  </a:cxn>
+                  <a:cxn ang="0">
+                    <a:pos x="connsiteX1" y="connsiteY1"/>
+                  </a:cxn>
+                  <a:cxn ang="0">
+                    <a:pos x="connsiteX2" y="connsiteY2"/>
+                  </a:cxn>
+                  <a:cxn ang="0">
+                    <a:pos x="connsiteX3" y="connsiteY3"/>
+                  </a:cxn>
+                  <a:cxn ang="0">
+                    <a:pos x="connsiteX4" y="connsiteY4"/>
+                  </a:cxn>
+                  <a:cxn ang="0">
+                    <a:pos x="connsiteX5" y="connsiteY5"/>
+                  </a:cxn>
+                  <a:cxn ang="0">
+                    <a:pos x="connsiteX6" y="connsiteY6"/>
+                  </a:cxn>
+                  <a:cxn ang="0">
+                    <a:pos x="connsiteX7" y="connsiteY7"/>
+                  </a:cxn>
+                </a:cxnLst>
+                <a:rect l="l" t="t" r="r" b="b"/>
+                <a:pathLst>
+                  <a:path w="1088572" h="2784076">
+                    <a:moveTo>
+                      <a:pt x="544286" y="0"/>
+                    </a:moveTo>
+                    <a:lnTo>
+                      <a:pt x="617933" y="81032"/>
+                    </a:lnTo>
+                    <a:cubicBezTo>
+                      <a:pt x="911951" y="437300"/>
+                      <a:pt x="1088572" y="894043"/>
+                      <a:pt x="1088572" y="1392038"/>
+                    </a:cubicBezTo>
+                    <a:cubicBezTo>
+                      <a:pt x="1088572" y="1890034"/>
+                      <a:pt x="911951" y="2346777"/>
+                      <a:pt x="617933" y="2703044"/>
+                    </a:cubicBezTo>
+                    <a:lnTo>
+                      <a:pt x="544286" y="2784076"/>
+                    </a:lnTo>
+                    <a:lnTo>
+                      <a:pt x="470639" y="2703044"/>
+                    </a:lnTo>
+                    <a:cubicBezTo>
+                      <a:pt x="176621" y="2346777"/>
+                      <a:pt x="0" y="1890034"/>
+                      <a:pt x="0" y="1392038"/>
+                    </a:cubicBezTo>
+                    <a:cubicBezTo>
+                      <a:pt x="0" y="894043"/>
+                      <a:pt x="176621" y="437300"/>
+                      <a:pt x="470639" y="81032"/>
+                    </a:cubicBezTo>
+                    <a:close/>
+                  </a:path>
+                </a:pathLst>
+              </a:custGeom>
+              <a:gradFill flip="none" rotWithShape="1">
+                <a:gsLst>
+                  <a:gs pos="0">
+                    <a:srgbClr val="000818"/>
+                  </a:gs>
+                  <a:gs pos="100000">
+                    <a:srgbClr val="0036A2">
+                      <a:alpha val="50000"/>
+                    </a:srgbClr>
+                  </a:gs>
+                </a:gsLst>
+                <a:path path="circle">
+                  <a:fillToRect l="100000" t="100000"/>
+                </a:path>
+                <a:tileRect r="-100000" b="-100000"/>
+              </a:gradFill>
+              <a:ln>
+                <a:noFill/>
+              </a:ln>
+            </p:spPr>
+            <p:style>
+              <a:lnRef idx="2">
+                <a:schemeClr val="accent1">
+                  <a:shade val="15000"/>
+                </a:schemeClr>
+              </a:lnRef>
+              <a:fillRef idx="1">
+                <a:schemeClr val="accent1"/>
+              </a:fillRef>
+              <a:effectRef idx="0">
+                <a:schemeClr val="accent1"/>
+              </a:effectRef>
+              <a:fontRef idx="minor">
+                <a:schemeClr val="lt1"/>
+              </a:fontRef>
+            </p:style>
+            <p:txBody>
+              <a:bodyPr wrap="square" rtlCol="0" anchor="ctr">
+                <a:noAutofit/>
+              </a:bodyPr>
+              <a:lstStyle/>
+              <a:p>
+                <a:pPr algn="ctr"/>
+                <a:endParaRPr lang="zh-CN" altLang="en-US" dirty="0"/>
+              </a:p>
+            </p:txBody>
+          </p:sp>
+          <p:sp>
+            <p:nvSpPr>
+              <p:cNvPr id="22" name="任意多边形: 形状 21">
+                <a:extLst>
+                  <a:ext uri="{FF2B5EF4-FFF2-40B4-BE49-F238E27FC236}">
+                    <a16:creationId xmlns:a16="http://schemas.microsoft.com/office/drawing/2014/main" id="{D4654661-CD56-1ACB-70C2-A983FCBC9746}"/>
+                  </a:ext>
+                </a:extLst>
+              </p:cNvPr>
+              <p:cNvSpPr/>
+              <p:nvPr/>
+            </p:nvSpPr>
+            <p:spPr>
+              <a:xfrm rot="2988853">
+                <a:off x="6626487" y="4399162"/>
+                <a:ext cx="1088572" cy="2784076"/>
+              </a:xfrm>
+              <a:custGeom>
+                <a:avLst/>
+                <a:gdLst>
+                  <a:gd name="connsiteX0" fmla="*/ 544286 w 1088572"/>
+                  <a:gd name="connsiteY0" fmla="*/ 0 h 2784076"/>
+                  <a:gd name="connsiteX1" fmla="*/ 617933 w 1088572"/>
+                  <a:gd name="connsiteY1" fmla="*/ 81032 h 2784076"/>
+                  <a:gd name="connsiteX2" fmla="*/ 1088572 w 1088572"/>
+                  <a:gd name="connsiteY2" fmla="*/ 1392038 h 2784076"/>
+                  <a:gd name="connsiteX3" fmla="*/ 617933 w 1088572"/>
+                  <a:gd name="connsiteY3" fmla="*/ 2703044 h 2784076"/>
+                  <a:gd name="connsiteX4" fmla="*/ 544286 w 1088572"/>
+                  <a:gd name="connsiteY4" fmla="*/ 2784076 h 2784076"/>
+                  <a:gd name="connsiteX5" fmla="*/ 470639 w 1088572"/>
+                  <a:gd name="connsiteY5" fmla="*/ 2703044 h 2784076"/>
+                  <a:gd name="connsiteX6" fmla="*/ 0 w 1088572"/>
+                  <a:gd name="connsiteY6" fmla="*/ 1392038 h 2784076"/>
+                  <a:gd name="connsiteX7" fmla="*/ 470639 w 1088572"/>
+                  <a:gd name="connsiteY7" fmla="*/ 81032 h 2784076"/>
+                </a:gdLst>
+                <a:ahLst/>
+                <a:cxnLst>
+                  <a:cxn ang="0">
+                    <a:pos x="connsiteX0" y="connsiteY0"/>
+                  </a:cxn>
+                  <a:cxn ang="0">
+                    <a:pos x="connsiteX1" y="connsiteY1"/>
+                  </a:cxn>
+                  <a:cxn ang="0">
+                    <a:pos x="connsiteX2" y="connsiteY2"/>
+                  </a:cxn>
+                  <a:cxn ang="0">
+                    <a:pos x="connsiteX3" y="connsiteY3"/>
+                  </a:cxn>
+                  <a:cxn ang="0">
+                    <a:pos x="connsiteX4" y="connsiteY4"/>
+                  </a:cxn>
+                  <a:cxn ang="0">
+                    <a:pos x="connsiteX5" y="connsiteY5"/>
+                  </a:cxn>
+                  <a:cxn ang="0">
+                    <a:pos x="connsiteX6" y="connsiteY6"/>
+                  </a:cxn>
+                  <a:cxn ang="0">
+                    <a:pos x="connsiteX7" y="connsiteY7"/>
+                  </a:cxn>
+                </a:cxnLst>
+                <a:rect l="l" t="t" r="r" b="b"/>
+                <a:pathLst>
+                  <a:path w="1088572" h="2784076">
+                    <a:moveTo>
+                      <a:pt x="544286" y="0"/>
+                    </a:moveTo>
+                    <a:lnTo>
+                      <a:pt x="617933" y="81032"/>
+                    </a:lnTo>
+                    <a:cubicBezTo>
+                      <a:pt x="911951" y="437300"/>
+                      <a:pt x="1088572" y="894043"/>
+                      <a:pt x="1088572" y="1392038"/>
+                    </a:cubicBezTo>
+                    <a:cubicBezTo>
+                      <a:pt x="1088572" y="1890034"/>
+                      <a:pt x="911951" y="2346777"/>
+                      <a:pt x="617933" y="2703044"/>
+                    </a:cubicBezTo>
+                    <a:lnTo>
+                      <a:pt x="544286" y="2784076"/>
+                    </a:lnTo>
+                    <a:lnTo>
+                      <a:pt x="470639" y="2703044"/>
+                    </a:lnTo>
+                    <a:cubicBezTo>
+                      <a:pt x="176621" y="2346777"/>
+                      <a:pt x="0" y="1890034"/>
+                      <a:pt x="0" y="1392038"/>
+                    </a:cubicBezTo>
+                    <a:cubicBezTo>
+                      <a:pt x="0" y="894043"/>
+                      <a:pt x="176621" y="437300"/>
+                      <a:pt x="470639" y="81032"/>
+                    </a:cubicBezTo>
+                    <a:close/>
+                  </a:path>
+                </a:pathLst>
+              </a:custGeom>
+              <a:gradFill flip="none" rotWithShape="1">
+                <a:gsLst>
+                  <a:gs pos="0">
+                    <a:srgbClr val="000818"/>
+                  </a:gs>
+                  <a:gs pos="100000">
+                    <a:srgbClr val="0036A2">
+                      <a:alpha val="50000"/>
+                    </a:srgbClr>
+                  </a:gs>
+                </a:gsLst>
+                <a:path path="circle">
+                  <a:fillToRect l="100000" t="100000"/>
+                </a:path>
+                <a:tileRect r="-100000" b="-100000"/>
+              </a:gradFill>
+              <a:ln>
+                <a:noFill/>
+              </a:ln>
+            </p:spPr>
+            <p:style>
+              <a:lnRef idx="2">
+                <a:schemeClr val="accent1">
+                  <a:shade val="15000"/>
+                </a:schemeClr>
+              </a:lnRef>
+              <a:fillRef idx="1">
+                <a:schemeClr val="accent1"/>
+              </a:fillRef>
+              <a:effectRef idx="0">
+                <a:schemeClr val="accent1"/>
+              </a:effectRef>
+              <a:fontRef idx="minor">
+                <a:schemeClr val="lt1"/>
+              </a:fontRef>
+            </p:style>
+            <p:txBody>
+              <a:bodyPr wrap="square" rtlCol="0" anchor="ctr">
+                <a:noAutofit/>
+              </a:bodyPr>
+              <a:lstStyle/>
+              <a:p>
+                <a:pPr algn="ctr"/>
+                <a:endParaRPr lang="zh-CN" altLang="en-US"/>
+              </a:p>
+            </p:txBody>
+          </p:sp>
+          <p:sp>
+            <p:nvSpPr>
+              <p:cNvPr id="23" name="任意多边形: 形状 22">
+                <a:extLst>
+                  <a:ext uri="{FF2B5EF4-FFF2-40B4-BE49-F238E27FC236}">
+                    <a16:creationId xmlns:a16="http://schemas.microsoft.com/office/drawing/2014/main" id="{F8A65C29-52C1-952D-7A56-F88BDA2EDC45}"/>
+                  </a:ext>
+                </a:extLst>
+              </p:cNvPr>
+              <p:cNvSpPr/>
+              <p:nvPr/>
+            </p:nvSpPr>
+            <p:spPr>
+              <a:xfrm rot="1356476">
+                <a:off x="6226332" y="3971657"/>
+                <a:ext cx="1088572" cy="2784076"/>
+              </a:xfrm>
+              <a:custGeom>
+                <a:avLst/>
+                <a:gdLst>
+                  <a:gd name="connsiteX0" fmla="*/ 544286 w 1088572"/>
+                  <a:gd name="connsiteY0" fmla="*/ 0 h 2784076"/>
+                  <a:gd name="connsiteX1" fmla="*/ 617933 w 1088572"/>
+                  <a:gd name="connsiteY1" fmla="*/ 81032 h 2784076"/>
+                  <a:gd name="connsiteX2" fmla="*/ 1088572 w 1088572"/>
+                  <a:gd name="connsiteY2" fmla="*/ 1392038 h 2784076"/>
+                  <a:gd name="connsiteX3" fmla="*/ 617933 w 1088572"/>
+                  <a:gd name="connsiteY3" fmla="*/ 2703044 h 2784076"/>
+                  <a:gd name="connsiteX4" fmla="*/ 544286 w 1088572"/>
+                  <a:gd name="connsiteY4" fmla="*/ 2784076 h 2784076"/>
+                  <a:gd name="connsiteX5" fmla="*/ 470639 w 1088572"/>
+                  <a:gd name="connsiteY5" fmla="*/ 2703044 h 2784076"/>
+                  <a:gd name="connsiteX6" fmla="*/ 0 w 1088572"/>
+                  <a:gd name="connsiteY6" fmla="*/ 1392038 h 2784076"/>
+                  <a:gd name="connsiteX7" fmla="*/ 470639 w 1088572"/>
+                  <a:gd name="connsiteY7" fmla="*/ 81032 h 2784076"/>
+                </a:gdLst>
+                <a:ahLst/>
+                <a:cxnLst>
+                  <a:cxn ang="0">
+                    <a:pos x="connsiteX0" y="connsiteY0"/>
+                  </a:cxn>
+                  <a:cxn ang="0">
+                    <a:pos x="connsiteX1" y="connsiteY1"/>
+                  </a:cxn>
+                  <a:cxn ang="0">
+                    <a:pos x="connsiteX2" y="connsiteY2"/>
+                  </a:cxn>
+                  <a:cxn ang="0">
+                    <a:pos x="connsiteX3" y="connsiteY3"/>
+                  </a:cxn>
+                  <a:cxn ang="0">
+                    <a:pos x="connsiteX4" y="connsiteY4"/>
+                  </a:cxn>
+                  <a:cxn ang="0">
+                    <a:pos x="connsiteX5" y="connsiteY5"/>
+                  </a:cxn>
+                  <a:cxn ang="0">
+                    <a:pos x="connsiteX6" y="connsiteY6"/>
+                  </a:cxn>
+                  <a:cxn ang="0">
+                    <a:pos x="connsiteX7" y="connsiteY7"/>
+                  </a:cxn>
+                </a:cxnLst>
+                <a:rect l="l" t="t" r="r" b="b"/>
+                <a:pathLst>
+                  <a:path w="1088572" h="2784076">
+                    <a:moveTo>
+                      <a:pt x="544286" y="0"/>
+                    </a:moveTo>
+                    <a:lnTo>
+                      <a:pt x="617933" y="81032"/>
+                    </a:lnTo>
+                    <a:cubicBezTo>
+                      <a:pt x="911951" y="437300"/>
+                      <a:pt x="1088572" y="894043"/>
+                      <a:pt x="1088572" y="1392038"/>
+                    </a:cubicBezTo>
+                    <a:cubicBezTo>
+                      <a:pt x="1088572" y="1890034"/>
+                      <a:pt x="911951" y="2346777"/>
+                      <a:pt x="617933" y="2703044"/>
+                    </a:cubicBezTo>
+                    <a:lnTo>
+                      <a:pt x="544286" y="2784076"/>
+                    </a:lnTo>
+                    <a:lnTo>
+                      <a:pt x="470639" y="2703044"/>
+                    </a:lnTo>
+                    <a:cubicBezTo>
+                      <a:pt x="176621" y="2346777"/>
+                      <a:pt x="0" y="1890034"/>
+                      <a:pt x="0" y="1392038"/>
+                    </a:cubicBezTo>
+                    <a:cubicBezTo>
+                      <a:pt x="0" y="894043"/>
+                      <a:pt x="176621" y="437300"/>
+                      <a:pt x="470639" y="81032"/>
+                    </a:cubicBezTo>
+                    <a:close/>
+                  </a:path>
+                </a:pathLst>
+              </a:custGeom>
+              <a:gradFill flip="none" rotWithShape="1">
+                <a:gsLst>
+                  <a:gs pos="0">
+                    <a:srgbClr val="000818"/>
+                  </a:gs>
+                  <a:gs pos="100000">
+                    <a:srgbClr val="0036A2">
+                      <a:alpha val="50000"/>
+                    </a:srgbClr>
+                  </a:gs>
+                </a:gsLst>
+                <a:path path="circle">
+                  <a:fillToRect l="100000" t="100000"/>
+                </a:path>
+                <a:tileRect r="-100000" b="-100000"/>
+              </a:gradFill>
+              <a:ln>
+                <a:noFill/>
+              </a:ln>
+            </p:spPr>
+            <p:style>
+              <a:lnRef idx="2">
+                <a:schemeClr val="accent1">
+                  <a:shade val="15000"/>
+                </a:schemeClr>
+              </a:lnRef>
+              <a:fillRef idx="1">
+                <a:schemeClr val="accent1"/>
+              </a:fillRef>
+              <a:effectRef idx="0">
+                <a:schemeClr val="accent1"/>
+              </a:effectRef>
+              <a:fontRef idx="minor">
+                <a:schemeClr val="lt1"/>
+              </a:fontRef>
+            </p:style>
+            <p:txBody>
+              <a:bodyPr wrap="square" rtlCol="0" anchor="ctr">
+                <a:noAutofit/>
+              </a:bodyPr>
+              <a:lstStyle/>
+              <a:p>
+                <a:pPr algn="ctr"/>
+                <a:endParaRPr lang="zh-CN" altLang="en-US"/>
+              </a:p>
+            </p:txBody>
+          </p:sp>
+          <p:sp>
+            <p:nvSpPr>
+              <p:cNvPr id="24" name="任意多边形: 形状 23">
+                <a:extLst>
+                  <a:ext uri="{FF2B5EF4-FFF2-40B4-BE49-F238E27FC236}">
+                    <a16:creationId xmlns:a16="http://schemas.microsoft.com/office/drawing/2014/main" id="{EF955586-9F40-B728-0BC3-72DD5751EC34}"/>
+                  </a:ext>
+                </a:extLst>
+              </p:cNvPr>
+              <p:cNvSpPr/>
+              <p:nvPr/>
+            </p:nvSpPr>
+            <p:spPr>
+              <a:xfrm rot="21426923">
+                <a:off x="5551713" y="3880502"/>
+                <a:ext cx="1088572" cy="2784076"/>
+              </a:xfrm>
+              <a:custGeom>
+                <a:avLst/>
+                <a:gdLst>
+                  <a:gd name="connsiteX0" fmla="*/ 544286 w 1088572"/>
+                  <a:gd name="connsiteY0" fmla="*/ 0 h 2784076"/>
+                  <a:gd name="connsiteX1" fmla="*/ 617933 w 1088572"/>
+                  <a:gd name="connsiteY1" fmla="*/ 81032 h 2784076"/>
+                  <a:gd name="connsiteX2" fmla="*/ 1088572 w 1088572"/>
+                  <a:gd name="connsiteY2" fmla="*/ 1392038 h 2784076"/>
+                  <a:gd name="connsiteX3" fmla="*/ 617933 w 1088572"/>
+                  <a:gd name="connsiteY3" fmla="*/ 2703044 h 2784076"/>
+                  <a:gd name="connsiteX4" fmla="*/ 544286 w 1088572"/>
+                  <a:gd name="connsiteY4" fmla="*/ 2784076 h 2784076"/>
+                  <a:gd name="connsiteX5" fmla="*/ 470639 w 1088572"/>
+                  <a:gd name="connsiteY5" fmla="*/ 2703044 h 2784076"/>
+                  <a:gd name="connsiteX6" fmla="*/ 0 w 1088572"/>
+                  <a:gd name="connsiteY6" fmla="*/ 1392038 h 2784076"/>
+                  <a:gd name="connsiteX7" fmla="*/ 470639 w 1088572"/>
+                  <a:gd name="connsiteY7" fmla="*/ 81032 h 2784076"/>
+                </a:gdLst>
+                <a:ahLst/>
+                <a:cxnLst>
+                  <a:cxn ang="0">
+                    <a:pos x="connsiteX0" y="connsiteY0"/>
+                  </a:cxn>
+                  <a:cxn ang="0">
+                    <a:pos x="connsiteX1" y="connsiteY1"/>
+                  </a:cxn>
+                  <a:cxn ang="0">
+                    <a:pos x="connsiteX2" y="connsiteY2"/>
+                  </a:cxn>
+                  <a:cxn ang="0">
+                    <a:pos x="connsiteX3" y="connsiteY3"/>
+                  </a:cxn>
+                  <a:cxn ang="0">
+                    <a:pos x="connsiteX4" y="connsiteY4"/>
+                  </a:cxn>
+                  <a:cxn ang="0">
+                    <a:pos x="connsiteX5" y="connsiteY5"/>
+                  </a:cxn>
+                  <a:cxn ang="0">
+                    <a:pos x="connsiteX6" y="connsiteY6"/>
+                  </a:cxn>
+                  <a:cxn ang="0">
+                    <a:pos x="connsiteX7" y="connsiteY7"/>
+                  </a:cxn>
+                </a:cxnLst>
+                <a:rect l="l" t="t" r="r" b="b"/>
+                <a:pathLst>
+                  <a:path w="1088572" h="2784076">
+                    <a:moveTo>
+                      <a:pt x="544286" y="0"/>
+                    </a:moveTo>
+                    <a:lnTo>
+                      <a:pt x="617933" y="81032"/>
+                    </a:lnTo>
+                    <a:cubicBezTo>
+                      <a:pt x="911951" y="437300"/>
+                      <a:pt x="1088572" y="894043"/>
+                      <a:pt x="1088572" y="1392038"/>
+                    </a:cubicBezTo>
+                    <a:cubicBezTo>
+                      <a:pt x="1088572" y="1890034"/>
+                      <a:pt x="911951" y="2346777"/>
+                      <a:pt x="617933" y="2703044"/>
+                    </a:cubicBezTo>
+                    <a:lnTo>
+                      <a:pt x="544286" y="2784076"/>
+                    </a:lnTo>
+                    <a:lnTo>
+                      <a:pt x="470639" y="2703044"/>
+                    </a:lnTo>
+                    <a:cubicBezTo>
+                      <a:pt x="176621" y="2346777"/>
+                      <a:pt x="0" y="1890034"/>
+                      <a:pt x="0" y="1392038"/>
+                    </a:cubicBezTo>
+                    <a:cubicBezTo>
+                      <a:pt x="0" y="894043"/>
+                      <a:pt x="176621" y="437300"/>
+                      <a:pt x="470639" y="81032"/>
+                    </a:cubicBezTo>
+                    <a:close/>
+                  </a:path>
+                </a:pathLst>
+              </a:custGeom>
+              <a:gradFill flip="none" rotWithShape="1">
+                <a:gsLst>
+                  <a:gs pos="0">
+                    <a:srgbClr val="000818"/>
+                  </a:gs>
+                  <a:gs pos="100000">
+                    <a:srgbClr val="0036A2">
+                      <a:alpha val="50000"/>
+                    </a:srgbClr>
+                  </a:gs>
+                </a:gsLst>
+                <a:path path="circle">
+                  <a:fillToRect l="100000" t="100000"/>
+                </a:path>
+                <a:tileRect r="-100000" b="-100000"/>
+              </a:gradFill>
+              <a:ln>
+                <a:noFill/>
+              </a:ln>
+            </p:spPr>
+            <p:style>
+              <a:lnRef idx="2">
+                <a:schemeClr val="accent1">
+                  <a:shade val="15000"/>
+                </a:schemeClr>
+              </a:lnRef>
+              <a:fillRef idx="1">
+                <a:schemeClr val="accent1"/>
+              </a:fillRef>
+              <a:effectRef idx="0">
+                <a:schemeClr val="accent1"/>
+              </a:effectRef>
+              <a:fontRef idx="minor">
+                <a:schemeClr val="lt1"/>
+              </a:fontRef>
+            </p:style>
+            <p:txBody>
+              <a:bodyPr wrap="square" rtlCol="0" anchor="ctr">
+                <a:noAutofit/>
+              </a:bodyPr>
+              <a:lstStyle/>
+              <a:p>
+                <a:pPr algn="ctr"/>
+                <a:endParaRPr lang="zh-CN" altLang="en-US"/>
+              </a:p>
+            </p:txBody>
+          </p:sp>
+        </p:grpSp>
+      </p:grpSp>
+      <p:sp>
+        <p:nvSpPr>
+          <p:cNvPr id="2" name="任意多边形: 形状 1">
+            <a:extLst>
+              <a:ext uri="{FF2B5EF4-FFF2-40B4-BE49-F238E27FC236}">
+                <a16:creationId xmlns:a16="http://schemas.microsoft.com/office/drawing/2014/main" id="{EE85EB0D-C3DA-421E-BB92-FA03387CECDF}"/>
+              </a:ext>
+            </a:extLst>
+          </p:cNvPr>
+          <p:cNvSpPr/>
+          <p:nvPr/>
+        </p:nvSpPr>
+        <p:spPr>
+          <a:xfrm>
+            <a:off x="5929157" y="3243360"/>
+            <a:ext cx="343361" cy="368901"/>
+          </a:xfrm>
+          <a:custGeom>
+            <a:avLst/>
+            <a:gdLst>
+              <a:gd name="connsiteX0" fmla="*/ 426720 w 1053737"/>
+              <a:gd name="connsiteY0" fmla="*/ 505098 h 1132115"/>
+              <a:gd name="connsiteX1" fmla="*/ 522512 w 1053737"/>
+              <a:gd name="connsiteY1" fmla="*/ 505098 h 1132115"/>
+              <a:gd name="connsiteX2" fmla="*/ 627017 w 1053737"/>
+              <a:gd name="connsiteY2" fmla="*/ 609603 h 1132115"/>
+              <a:gd name="connsiteX3" fmla="*/ 627017 w 1053737"/>
+              <a:gd name="connsiteY3" fmla="*/ 627017 h 1132115"/>
+              <a:gd name="connsiteX4" fmla="*/ 426720 w 1053737"/>
+              <a:gd name="connsiteY4" fmla="*/ 627017 h 1132115"/>
+              <a:gd name="connsiteX5" fmla="*/ 104505 w 1053737"/>
+              <a:gd name="connsiteY5" fmla="*/ 505098 h 1132115"/>
+              <a:gd name="connsiteX6" fmla="*/ 113212 w 1053737"/>
+              <a:gd name="connsiteY6" fmla="*/ 505098 h 1132115"/>
+              <a:gd name="connsiteX7" fmla="*/ 113212 w 1053737"/>
+              <a:gd name="connsiteY7" fmla="*/ 522512 h 1132115"/>
+              <a:gd name="connsiteX8" fmla="*/ 217717 w 1053737"/>
+              <a:gd name="connsiteY8" fmla="*/ 627017 h 1132115"/>
+              <a:gd name="connsiteX9" fmla="*/ 426720 w 1053737"/>
+              <a:gd name="connsiteY9" fmla="*/ 627017 h 1132115"/>
+              <a:gd name="connsiteX10" fmla="*/ 426720 w 1053737"/>
+              <a:gd name="connsiteY10" fmla="*/ 775061 h 1132115"/>
+              <a:gd name="connsiteX11" fmla="*/ 531225 w 1053737"/>
+              <a:gd name="connsiteY11" fmla="*/ 879566 h 1132115"/>
+              <a:gd name="connsiteX12" fmla="*/ 627017 w 1053737"/>
+              <a:gd name="connsiteY12" fmla="*/ 879566 h 1132115"/>
+              <a:gd name="connsiteX13" fmla="*/ 627017 w 1053737"/>
+              <a:gd name="connsiteY13" fmla="*/ 1027610 h 1132115"/>
+              <a:gd name="connsiteX14" fmla="*/ 522512 w 1053737"/>
+              <a:gd name="connsiteY14" fmla="*/ 1132115 h 1132115"/>
+              <a:gd name="connsiteX15" fmla="*/ 104505 w 1053737"/>
+              <a:gd name="connsiteY15" fmla="*/ 1132115 h 1132115"/>
+              <a:gd name="connsiteX16" fmla="*/ 0 w 1053737"/>
+              <a:gd name="connsiteY16" fmla="*/ 1027610 h 1132115"/>
+              <a:gd name="connsiteX17" fmla="*/ 0 w 1053737"/>
+              <a:gd name="connsiteY17" fmla="*/ 609603 h 1132115"/>
+              <a:gd name="connsiteX18" fmla="*/ 104505 w 1053737"/>
+              <a:gd name="connsiteY18" fmla="*/ 505098 h 1132115"/>
+              <a:gd name="connsiteX19" fmla="*/ 740229 w 1053737"/>
+              <a:gd name="connsiteY19" fmla="*/ 252549 h 1132115"/>
+              <a:gd name="connsiteX20" fmla="*/ 949232 w 1053737"/>
+              <a:gd name="connsiteY20" fmla="*/ 252549 h 1132115"/>
+              <a:gd name="connsiteX21" fmla="*/ 1053737 w 1053737"/>
+              <a:gd name="connsiteY21" fmla="*/ 357054 h 1132115"/>
+              <a:gd name="connsiteX22" fmla="*/ 1053737 w 1053737"/>
+              <a:gd name="connsiteY22" fmla="*/ 775061 h 1132115"/>
+              <a:gd name="connsiteX23" fmla="*/ 949232 w 1053737"/>
+              <a:gd name="connsiteY23" fmla="*/ 879566 h 1132115"/>
+              <a:gd name="connsiteX24" fmla="*/ 627017 w 1053737"/>
+              <a:gd name="connsiteY24" fmla="*/ 879566 h 1132115"/>
+              <a:gd name="connsiteX25" fmla="*/ 627017 w 1053737"/>
+              <a:gd name="connsiteY25" fmla="*/ 627017 h 1132115"/>
+              <a:gd name="connsiteX26" fmla="*/ 635724 w 1053737"/>
+              <a:gd name="connsiteY26" fmla="*/ 627017 h 1132115"/>
+              <a:gd name="connsiteX27" fmla="*/ 740229 w 1053737"/>
+              <a:gd name="connsiteY27" fmla="*/ 522512 h 1132115"/>
+              <a:gd name="connsiteX28" fmla="*/ 217717 w 1053737"/>
+              <a:gd name="connsiteY28" fmla="*/ 0 h 1132115"/>
+              <a:gd name="connsiteX29" fmla="*/ 635724 w 1053737"/>
+              <a:gd name="connsiteY29" fmla="*/ 0 h 1132115"/>
+              <a:gd name="connsiteX30" fmla="*/ 740229 w 1053737"/>
+              <a:gd name="connsiteY30" fmla="*/ 104505 h 1132115"/>
+              <a:gd name="connsiteX31" fmla="*/ 740229 w 1053737"/>
+              <a:gd name="connsiteY31" fmla="*/ 252549 h 1132115"/>
+              <a:gd name="connsiteX32" fmla="*/ 531225 w 1053737"/>
+              <a:gd name="connsiteY32" fmla="*/ 252549 h 1132115"/>
+              <a:gd name="connsiteX33" fmla="*/ 426720 w 1053737"/>
+              <a:gd name="connsiteY33" fmla="*/ 357054 h 1132115"/>
+              <a:gd name="connsiteX34" fmla="*/ 426720 w 1053737"/>
+              <a:gd name="connsiteY34" fmla="*/ 505098 h 1132115"/>
+              <a:gd name="connsiteX35" fmla="*/ 113212 w 1053737"/>
+              <a:gd name="connsiteY35" fmla="*/ 505098 h 1132115"/>
+              <a:gd name="connsiteX36" fmla="*/ 113212 w 1053737"/>
+              <a:gd name="connsiteY36" fmla="*/ 104505 h 1132115"/>
+              <a:gd name="connsiteX37" fmla="*/ 217717 w 1053737"/>
+              <a:gd name="connsiteY37" fmla="*/ 0 h 1132115"/>
+            </a:gdLst>
+            <a:ahLst/>
+            <a:cxnLst>
+              <a:cxn ang="0">
+                <a:pos x="connsiteX0" y="connsiteY0"/>
+              </a:cxn>
+              <a:cxn ang="0">
+                <a:pos x="connsiteX1" y="connsiteY1"/>
+              </a:cxn>
+              <a:cxn ang="0">
+                <a:pos x="connsiteX2" y="connsiteY2"/>
+              </a:cxn>
+              <a:cxn ang="0">
+                <a:pos x="connsiteX3" y="connsiteY3"/>
+              </a:cxn>
+              <a:cxn ang="0">
+                <a:pos x="connsiteX4" y="connsiteY4"/>
+              </a:cxn>
+              <a:cxn ang="0">
+                <a:pos x="connsiteX5" y="connsiteY5"/>
+              </a:cxn>
+              <a:cxn ang="0">
+                <a:pos x="connsiteX6" y="connsiteY6"/>
+              </a:cxn>
+              <a:cxn ang="0">
+                <a:pos x="connsiteX7" y="connsiteY7"/>
+              </a:cxn>
+              <a:cxn ang="0">
+                <a:pos x="connsiteX8" y="connsiteY8"/>
+              </a:cxn>
+              <a:cxn ang="0">
+                <a:pos x="connsiteX9" y="connsiteY9"/>
+              </a:cxn>
+              <a:cxn ang="0">
+                <a:pos x="connsiteX10" y="connsiteY10"/>
+              </a:cxn>
+              <a:cxn ang="0">
+                <a:pos x="connsiteX11" y="connsiteY11"/>
+              </a:cxn>
+              <a:cxn ang="0">
+                <a:pos x="connsiteX12" y="connsiteY12"/>
+              </a:cxn>
+              <a:cxn ang="0">
+                <a:pos x="connsiteX13" y="connsiteY13"/>
+              </a:cxn>
+              <a:cxn ang="0">
+                <a:pos x="connsiteX14" y="connsiteY14"/>
+              </a:cxn>
+              <a:cxn ang="0">
+                <a:pos x="connsiteX15" y="connsiteY15"/>
+              </a:cxn>
+              <a:cxn ang="0">
+                <a:pos x="connsiteX16" y="connsiteY16"/>
+              </a:cxn>
+              <a:cxn ang="0">
+                <a:pos x="connsiteX17" y="connsiteY17"/>
+              </a:cxn>
+              <a:cxn ang="0">
+                <a:pos x="connsiteX18" y="connsiteY18"/>
+              </a:cxn>
+              <a:cxn ang="0">
+                <a:pos x="connsiteX19" y="connsiteY19"/>
+              </a:cxn>
+              <a:cxn ang="0">
+                <a:pos x="connsiteX20" y="connsiteY20"/>
+              </a:cxn>
+              <a:cxn ang="0">
+                <a:pos x="connsiteX21" y="connsiteY21"/>
+              </a:cxn>
+              <a:cxn ang="0">
+                <a:pos x="connsiteX22" y="connsiteY22"/>
+              </a:cxn>
+              <a:cxn ang="0">
+                <a:pos x="connsiteX23" y="connsiteY23"/>
+              </a:cxn>
+              <a:cxn ang="0">
+                <a:pos x="connsiteX24" y="connsiteY24"/>
+              </a:cxn>
+              <a:cxn ang="0">
+                <a:pos x="connsiteX25" y="connsiteY25"/>
+              </a:cxn>
+              <a:cxn ang="0">
+                <a:pos x="connsiteX26" y="connsiteY26"/>
+              </a:cxn>
+              <a:cxn ang="0">
+                <a:pos x="connsiteX27" y="connsiteY27"/>
+              </a:cxn>
+              <a:cxn ang="0">
+                <a:pos x="connsiteX28" y="connsiteY28"/>
+              </a:cxn>
+              <a:cxn ang="0">
+                <a:pos x="connsiteX29" y="connsiteY29"/>
+              </a:cxn>
+              <a:cxn ang="0">
+                <a:pos x="connsiteX30" y="connsiteY30"/>
+              </a:cxn>
+              <a:cxn ang="0">
+                <a:pos x="connsiteX31" y="connsiteY31"/>
+              </a:cxn>
+              <a:cxn ang="0">
+                <a:pos x="connsiteX32" y="connsiteY32"/>
+              </a:cxn>
+              <a:cxn ang="0">
+                <a:pos x="connsiteX33" y="connsiteY33"/>
+              </a:cxn>
+              <a:cxn ang="0">
+                <a:pos x="connsiteX34" y="connsiteY34"/>
+              </a:cxn>
+              <a:cxn ang="0">
+                <a:pos x="connsiteX35" y="connsiteY35"/>
+              </a:cxn>
+              <a:cxn ang="0">
+                <a:pos x="connsiteX36" y="connsiteY36"/>
+              </a:cxn>
+              <a:cxn ang="0">
+                <a:pos x="connsiteX37" y="connsiteY37"/>
+              </a:cxn>
+            </a:cxnLst>
+            <a:rect l="l" t="t" r="r" b="b"/>
+            <a:pathLst>
+              <a:path w="1053737" h="1132115">
+                <a:moveTo>
+                  <a:pt x="426720" y="505098"/>
+                </a:moveTo>
+                <a:lnTo>
+                  <a:pt x="522512" y="505098"/>
+                </a:lnTo>
+                <a:cubicBezTo>
+                  <a:pt x="580229" y="505098"/>
+                  <a:pt x="627017" y="551886"/>
+                  <a:pt x="627017" y="609603"/>
+                </a:cubicBezTo>
+                <a:lnTo>
+                  <a:pt x="627017" y="627017"/>
+                </a:lnTo>
+                <a:lnTo>
+                  <a:pt x="426720" y="627017"/>
+                </a:lnTo>
+                <a:close/>
+                <a:moveTo>
+                  <a:pt x="104505" y="505098"/>
+                </a:moveTo>
+                <a:lnTo>
+                  <a:pt x="113212" y="505098"/>
+                </a:lnTo>
+                <a:lnTo>
+                  <a:pt x="113212" y="522512"/>
+                </a:lnTo>
+                <a:cubicBezTo>
+                  <a:pt x="113212" y="580229"/>
+                  <a:pt x="160000" y="627017"/>
+                  <a:pt x="217717" y="627017"/>
+                </a:cubicBezTo>
+                <a:lnTo>
+                  <a:pt x="426720" y="627017"/>
+                </a:lnTo>
+                <a:lnTo>
+                  <a:pt x="426720" y="775061"/>
+                </a:lnTo>
+                <a:cubicBezTo>
+                  <a:pt x="426720" y="832778"/>
+                  <a:pt x="473508" y="879566"/>
+                  <a:pt x="531225" y="879566"/>
+                </a:cubicBezTo>
+                <a:lnTo>
+                  <a:pt x="627017" y="879566"/>
+                </a:lnTo>
+                <a:lnTo>
+                  <a:pt x="627017" y="1027610"/>
+                </a:lnTo>
+                <a:cubicBezTo>
+                  <a:pt x="627017" y="1085327"/>
+                  <a:pt x="580229" y="1132115"/>
+                  <a:pt x="522512" y="1132115"/>
+                </a:cubicBezTo>
+                <a:lnTo>
+                  <a:pt x="104505" y="1132115"/>
+                </a:lnTo>
+                <a:cubicBezTo>
+                  <a:pt x="46788" y="1132115"/>
+                  <a:pt x="0" y="1085327"/>
+                  <a:pt x="0" y="1027610"/>
+                </a:cubicBezTo>
+                <a:lnTo>
+                  <a:pt x="0" y="609603"/>
+                </a:lnTo>
+                <a:cubicBezTo>
+                  <a:pt x="0" y="551886"/>
+                  <a:pt x="46788" y="505098"/>
+                  <a:pt x="104505" y="505098"/>
+                </a:cubicBezTo>
+                <a:close/>
+                <a:moveTo>
+                  <a:pt x="740229" y="252549"/>
+                </a:moveTo>
+                <a:lnTo>
+                  <a:pt x="949232" y="252549"/>
+                </a:lnTo>
+                <a:cubicBezTo>
+                  <a:pt x="1006949" y="252549"/>
+                  <a:pt x="1053737" y="299337"/>
+                  <a:pt x="1053737" y="357054"/>
+                </a:cubicBezTo>
+                <a:lnTo>
+                  <a:pt x="1053737" y="775061"/>
+                </a:lnTo>
+                <a:cubicBezTo>
+                  <a:pt x="1053737" y="832778"/>
+                  <a:pt x="1006949" y="879566"/>
+                  <a:pt x="949232" y="879566"/>
+                </a:cubicBezTo>
+                <a:lnTo>
+                  <a:pt x="627017" y="879566"/>
+                </a:lnTo>
+                <a:lnTo>
+                  <a:pt x="627017" y="627017"/>
+                </a:lnTo>
+                <a:lnTo>
+                  <a:pt x="635724" y="627017"/>
+                </a:lnTo>
+                <a:cubicBezTo>
+                  <a:pt x="693441" y="627017"/>
+                  <a:pt x="740229" y="580229"/>
+                  <a:pt x="740229" y="522512"/>
+                </a:cubicBezTo>
+                <a:close/>
+                <a:moveTo>
+                  <a:pt x="217717" y="0"/>
+                </a:moveTo>
+                <a:lnTo>
+                  <a:pt x="635724" y="0"/>
+                </a:lnTo>
+                <a:cubicBezTo>
+                  <a:pt x="693441" y="0"/>
+                  <a:pt x="740229" y="46788"/>
+                  <a:pt x="740229" y="104505"/>
+                </a:cubicBezTo>
+                <a:lnTo>
+                  <a:pt x="740229" y="252549"/>
+                </a:lnTo>
+                <a:lnTo>
+                  <a:pt x="531225" y="252549"/>
+                </a:lnTo>
+                <a:cubicBezTo>
+                  <a:pt x="473508" y="252549"/>
+                  <a:pt x="426720" y="299337"/>
+                  <a:pt x="426720" y="357054"/>
+                </a:cubicBezTo>
+                <a:lnTo>
+                  <a:pt x="426720" y="505098"/>
+                </a:lnTo>
+                <a:lnTo>
+                  <a:pt x="113212" y="505098"/>
+                </a:lnTo>
+                <a:lnTo>
+                  <a:pt x="113212" y="104505"/>
+                </a:lnTo>
+                <a:cubicBezTo>
+                  <a:pt x="113212" y="46788"/>
+                  <a:pt x="160000" y="0"/>
+                  <a:pt x="217717" y="0"/>
+                </a:cubicBezTo>
+                <a:close/>
+              </a:path>
+            </a:pathLst>
+          </a:custGeom>
+          <a:solidFill>
+            <a:srgbClr val="003CB4"/>
+          </a:solidFill>
+          <a:ln>
+            <a:noFill/>
+          </a:ln>
+        </p:spPr>
+        <p:style>
+          <a:lnRef idx="2">
+            <a:schemeClr val="accent1">
+              <a:shade val="15000"/>
+            </a:schemeClr>
+          </a:lnRef>
+          <a:fillRef idx="1">
+            <a:schemeClr val="accent1"/>
+          </a:fillRef>
+          <a:effectRef idx="0">
+            <a:schemeClr val="accent1"/>
+          </a:effectRef>
+          <a:fontRef idx="minor">
+            <a:schemeClr val="lt1"/>
+          </a:fontRef>
+        </p:style>
+        <p:txBody>
+          <a:bodyPr wrap="square" rtlCol="0" anchor="ctr">
+            <a:noAutofit/>
+          </a:bodyPr>
+          <a:lstStyle/>
+          <a:p>
+            <a:pPr algn="ctr"/>
+            <a:endParaRPr lang="zh-CN" altLang="en-US" dirty="0"/>
+          </a:p>
+        </p:txBody>
+      </p:sp>
+    </p:spTree>
+    <p:extLst>
+      <p:ext uri="{BB962C8B-B14F-4D97-AF65-F5344CB8AC3E}">
+        <p14:creationId xmlns:p14="http://schemas.microsoft.com/office/powerpoint/2010/main" val="370763854"/>
+      </p:ext>
+    </p:extLst>
+  </p:cSld>
+  <p:clrMapOvr>
+    <a:masterClrMapping/>
+  </p:clrMapOvr>
+</p:sld>
+</file>
+
 <file path=ppt/theme/theme1.xml><?xml version="1.0" encoding="utf-8"?>
 <a:theme xmlns:a="http://schemas.openxmlformats.org/drawingml/2006/main" name="Office 主题​​">
   <a:themeElements>

</xml_diff>

<commit_message>
Updated delete files and folders feature and fixed some bugs
</commit_message>
<xml_diff>
--- a/Privestornet/Privestornet/PSNApplication/static/images/images.pptx
+++ b/Privestornet/Privestornet/PSNApplication/static/images/images.pptx
@@ -264,7 +264,7 @@
           <a:p>
             <a:fld id="{1490F5A2-A8D0-41C9-935E-441DB79DC52F}" type="datetimeFigureOut">
               <a:rPr lang="zh-CN" altLang="en-US" smtClean="0"/>
-              <a:t>2023/10/9</a:t>
+              <a:t>2023/10/10</a:t>
             </a:fld>
             <a:endParaRPr lang="zh-CN" altLang="en-US"/>
           </a:p>
@@ -462,7 +462,7 @@
           <a:p>
             <a:fld id="{1490F5A2-A8D0-41C9-935E-441DB79DC52F}" type="datetimeFigureOut">
               <a:rPr lang="zh-CN" altLang="en-US" smtClean="0"/>
-              <a:t>2023/10/9</a:t>
+              <a:t>2023/10/10</a:t>
             </a:fld>
             <a:endParaRPr lang="zh-CN" altLang="en-US"/>
           </a:p>
@@ -670,7 +670,7 @@
           <a:p>
             <a:fld id="{1490F5A2-A8D0-41C9-935E-441DB79DC52F}" type="datetimeFigureOut">
               <a:rPr lang="zh-CN" altLang="en-US" smtClean="0"/>
-              <a:t>2023/10/9</a:t>
+              <a:t>2023/10/10</a:t>
             </a:fld>
             <a:endParaRPr lang="zh-CN" altLang="en-US"/>
           </a:p>
@@ -868,7 +868,7 @@
           <a:p>
             <a:fld id="{1490F5A2-A8D0-41C9-935E-441DB79DC52F}" type="datetimeFigureOut">
               <a:rPr lang="zh-CN" altLang="en-US" smtClean="0"/>
-              <a:t>2023/10/9</a:t>
+              <a:t>2023/10/10</a:t>
             </a:fld>
             <a:endParaRPr lang="zh-CN" altLang="en-US"/>
           </a:p>
@@ -1143,7 +1143,7 @@
           <a:p>
             <a:fld id="{1490F5A2-A8D0-41C9-935E-441DB79DC52F}" type="datetimeFigureOut">
               <a:rPr lang="zh-CN" altLang="en-US" smtClean="0"/>
-              <a:t>2023/10/9</a:t>
+              <a:t>2023/10/10</a:t>
             </a:fld>
             <a:endParaRPr lang="zh-CN" altLang="en-US"/>
           </a:p>
@@ -1408,7 +1408,7 @@
           <a:p>
             <a:fld id="{1490F5A2-A8D0-41C9-935E-441DB79DC52F}" type="datetimeFigureOut">
               <a:rPr lang="zh-CN" altLang="en-US" smtClean="0"/>
-              <a:t>2023/10/9</a:t>
+              <a:t>2023/10/10</a:t>
             </a:fld>
             <a:endParaRPr lang="zh-CN" altLang="en-US"/>
           </a:p>
@@ -1820,7 +1820,7 @@
           <a:p>
             <a:fld id="{1490F5A2-A8D0-41C9-935E-441DB79DC52F}" type="datetimeFigureOut">
               <a:rPr lang="zh-CN" altLang="en-US" smtClean="0"/>
-              <a:t>2023/10/9</a:t>
+              <a:t>2023/10/10</a:t>
             </a:fld>
             <a:endParaRPr lang="zh-CN" altLang="en-US"/>
           </a:p>
@@ -1961,7 +1961,7 @@
           <a:p>
             <a:fld id="{1490F5A2-A8D0-41C9-935E-441DB79DC52F}" type="datetimeFigureOut">
               <a:rPr lang="zh-CN" altLang="en-US" smtClean="0"/>
-              <a:t>2023/10/9</a:t>
+              <a:t>2023/10/10</a:t>
             </a:fld>
             <a:endParaRPr lang="zh-CN" altLang="en-US"/>
           </a:p>
@@ -2074,7 +2074,7 @@
           <a:p>
             <a:fld id="{1490F5A2-A8D0-41C9-935E-441DB79DC52F}" type="datetimeFigureOut">
               <a:rPr lang="zh-CN" altLang="en-US" smtClean="0"/>
-              <a:t>2023/10/9</a:t>
+              <a:t>2023/10/10</a:t>
             </a:fld>
             <a:endParaRPr lang="zh-CN" altLang="en-US"/>
           </a:p>
@@ -2385,7 +2385,7 @@
           <a:p>
             <a:fld id="{1490F5A2-A8D0-41C9-935E-441DB79DC52F}" type="datetimeFigureOut">
               <a:rPr lang="zh-CN" altLang="en-US" smtClean="0"/>
-              <a:t>2023/10/9</a:t>
+              <a:t>2023/10/10</a:t>
             </a:fld>
             <a:endParaRPr lang="zh-CN" altLang="en-US"/>
           </a:p>
@@ -2673,7 +2673,7 @@
           <a:p>
             <a:fld id="{1490F5A2-A8D0-41C9-935E-441DB79DC52F}" type="datetimeFigureOut">
               <a:rPr lang="zh-CN" altLang="en-US" smtClean="0"/>
-              <a:t>2023/10/9</a:t>
+              <a:t>2023/10/10</a:t>
             </a:fld>
             <a:endParaRPr lang="zh-CN" altLang="en-US"/>
           </a:p>
@@ -2914,7 +2914,7 @@
           <a:p>
             <a:fld id="{1490F5A2-A8D0-41C9-935E-441DB79DC52F}" type="datetimeFigureOut">
               <a:rPr lang="zh-CN" altLang="en-US" smtClean="0"/>
-              <a:t>2023/10/9</a:t>
+              <a:t>2023/10/10</a:t>
             </a:fld>
             <a:endParaRPr lang="zh-CN" altLang="en-US"/>
           </a:p>
@@ -5843,7 +5843,7 @@
         </p:blipFill>
         <p:spPr>
           <a:xfrm>
-            <a:off x="7114902" y="3182860"/>
+            <a:off x="3901439" y="-309277"/>
             <a:ext cx="2577738" cy="2577738"/>
           </a:xfrm>
           <a:prstGeom prst="rect">
@@ -5881,6 +5881,36 @@
           <a:xfrm>
             <a:off x="1564772" y="338457"/>
             <a:ext cx="1631670" cy="1631670"/>
+          </a:xfrm>
+          <a:prstGeom prst="rect">
+            <a:avLst/>
+          </a:prstGeom>
+        </p:spPr>
+      </p:pic>
+      <p:pic>
+        <p:nvPicPr>
+          <p:cNvPr id="3" name="图片 2">
+            <a:extLst>
+              <a:ext uri="{FF2B5EF4-FFF2-40B4-BE49-F238E27FC236}">
+                <a16:creationId xmlns:a16="http://schemas.microsoft.com/office/drawing/2014/main" id="{C92784D6-B6B9-EBD4-6B81-B1F2E1E81F07}"/>
+              </a:ext>
+            </a:extLst>
+          </p:cNvPr>
+          <p:cNvPicPr>
+            <a:picLocks noChangeAspect="1"/>
+          </p:cNvPicPr>
+          <p:nvPr/>
+        </p:nvPicPr>
+        <p:blipFill>
+          <a:blip r:embed="rId5"/>
+          <a:stretch>
+            <a:fillRect/>
+          </a:stretch>
+        </p:blipFill>
+        <p:spPr>
+          <a:xfrm>
+            <a:off x="6788464" y="3586058"/>
+            <a:ext cx="1691337" cy="1691337"/>
           </a:xfrm>
           <a:prstGeom prst="rect">
             <a:avLst/>
@@ -5981,7 +6011,7 @@
         </p:blipFill>
         <p:spPr>
           <a:xfrm>
-            <a:off x="933178" y="1258760"/>
+            <a:off x="-148086" y="298178"/>
             <a:ext cx="3876658" cy="3876658"/>
           </a:xfrm>
           <a:prstGeom prst="rect">
@@ -6003,7 +6033,7 @@
         </p:nvGrpSpPr>
         <p:grpSpPr>
           <a:xfrm>
-            <a:off x="2750565" y="3559351"/>
+            <a:off x="1669301" y="2598769"/>
             <a:ext cx="2200210" cy="2200210"/>
             <a:chOff x="3150997" y="3982876"/>
             <a:chExt cx="1616364" cy="1616364"/>

</xml_diff>